<commit_message>
Poster edited, still need more editing. I will keep working on it tomorrow :)
</commit_message>
<xml_diff>
--- a/mapping_project-poster.pptx
+++ b/mapping_project-poster.pptx
@@ -313,12 +313,8 @@
           </a:lstStyle>
           <a:p>
             <a:r>
-              <a:rPr lang="de-DE" sz="3000" dirty="0" err="1"/>
-              <a:t>by</a:t>
-            </a:r>
-            <a:r>
               <a:rPr lang="de-DE" sz="3000" dirty="0"/>
-              <a:t> </a:t>
+              <a:t>By </a:t>
             </a:r>
             <a:r>
               <a:rPr lang="de-DE" sz="3000" b="1" dirty="0" err="1"/>
@@ -334,7 +330,7 @@
             </a:r>
             <a:r>
               <a:rPr lang="de-DE" sz="3000" b="1" dirty="0"/>
-              <a:t>, Nele Peschel, Vivien van </a:t>
+              <a:t>, Nele Peschel &amp; Vivien van </a:t>
             </a:r>
             <a:r>
               <a:rPr lang="de-DE" sz="3000" b="1" dirty="0" err="1"/>
@@ -1500,7 +1496,7 @@
           <a:p>
             <a:r>
               <a:rPr lang="en-US" dirty="0"/>
-              <a:t>Google search terms, COVID-19, keyword 3</a:t>
+              <a:t>Google Search Terms, COVID-19, pandemic, Web Searches, essentials</a:t>
             </a:r>
           </a:p>
           <a:p>
@@ -1521,15 +1517,7 @@
           <a:p>
             <a:r>
               <a:rPr lang="en-US" dirty="0"/>
-              <a:t>https://searching-for-the-</a:t>
-            </a:r>
-            <a:r>
-              <a:rPr lang="en-US" dirty="0" err="1"/>
-              <a:t>essentials.herokuapp.com</a:t>
-            </a:r>
-            <a:r>
-              <a:rPr lang="en-US" dirty="0"/>
-              <a:t>/country</a:t>
+              <a:t>https://searching-for-the-essentials.herokuapp.com</a:t>
             </a:r>
           </a:p>
         </p:txBody>
@@ -1564,14 +1552,14 @@
           <a:p>
             <a:r>
               <a:rPr lang="en-US" dirty="0"/>
-              <a:t>Searching for the Essentials;</a:t>
+              <a:t>Searching for the Essentials</a:t>
             </a:r>
             <a:br>
               <a:rPr lang="en-US" dirty="0"/>
             </a:br>
             <a:r>
               <a:rPr lang="en-US" sz="6000" dirty="0"/>
-              <a:t>Impacts of COVID-19 on Web Searches for Food &amp; Other necessities</a:t>
+              <a:t>Impacts of COVID-19 on Web Searches for Food &amp; Other Necessities</a:t>
             </a:r>
             <a:endParaRPr lang="de-AT" sz="6000" dirty="0"/>
           </a:p>
@@ -1595,7 +1583,7 @@
         </p:nvSpPr>
         <p:spPr>
           <a:xfrm>
-            <a:off x="1080000" y="7019999"/>
+            <a:off x="1079625" y="7020000"/>
             <a:ext cx="4481625" cy="18081289"/>
           </a:xfrm>
         </p:spPr>
@@ -1607,15 +1595,15 @@
           <a:p>
             <a:r>
               <a:rPr lang="en-GB" sz="2400" b="1" dirty="0"/>
-              <a:t>When the COVID-19 pandemic hit the world, nearly every aspect of daily life was affected. The food industry, normally functioning smoothly and unobtrusively, was shaken as people began hoarding products like pasta, toilet paper, dried beans, and canned vegetables</a:t>
+              <a:t>When the COVID-19 pandemic hit the world, nearly every aspect of daily life was affected. The food industry, normally functioning smoothly and unobtrusively, was shaken as people began hoarding products like pasta, toilet paper or rice</a:t>
             </a:r>
             <a:r>
               <a:rPr lang="en-US" sz="2400" b="1" dirty="0"/>
-              <a:t>. </a:t>
+              <a:t>. Our interactive web map application aims</a:t>
             </a:r>
             <a:r>
               <a:rPr lang="en-GB" sz="2400" b="1" dirty="0"/>
-              <a:t>We would like to visualise the impact of COVID-19 on interests in food and other essential items in an interactive web map, based on the </a:t>
+              <a:t> to visualize the impact of COVID-19 on interests in food and other essential items in three European countries based on </a:t>
             </a:r>
             <a:r>
               <a:rPr lang="en-GB" sz="2400" b="1" i="1" dirty="0"/>
@@ -1632,17 +1620,17 @@
           <a:p>
             <a:r>
               <a:rPr lang="en-US" sz="2800" b="1" cap="all" spc="200" dirty="0"/>
-              <a:t>General?</a:t>
+              <a:t>Focus</a:t>
             </a:r>
           </a:p>
           <a:p>
             <a:r>
               <a:rPr lang="en-US" baseline="0" dirty="0"/>
-              <a:t>We have created an interactive website with two focuses. A main divergent proportional symbol map where the visitor can select one search term and compare the trend between the countries </a:t>
+              <a:t>Our interactive web application has two focuses: A main divergent proportional symbol map where the visitor can select one search term and compare the trend among </a:t>
             </a:r>
             <a:r>
               <a:rPr lang="en-US" dirty="0"/>
-              <a:t>Germany, the Netherlands and the United Kingdom, and radar chart where the visitor can see the difference across all search terms of the three countries, with the .</a:t>
+              <a:t>Germany, the Netherlands and the United Kingdom; and a radar chart allowing the visitor to discover differences between 15 selected  search terms for the three countries.</a:t>
             </a:r>
             <a:endParaRPr lang="en-US" baseline="0" dirty="0"/>
           </a:p>
@@ -1659,41 +1647,44 @@
           </a:p>
           <a:p>
             <a:r>
+              <a:rPr lang="en-US" dirty="0"/>
+              <a:t>When opening the web application or clicking on the navigation button FOOD, the user gets to select a search term by clicking on the respective icon (Fig. 1). The map</a:t>
+            </a:r>
+            <a:r>
               <a:rPr lang="en-US" baseline="0" dirty="0"/>
-              <a:t>To visualize one Search Term across </a:t>
+              <a:t> visualizes the Search Trend Popularity for the selected term during 2020 compared to the previous year without COVID-19 impact (Fig. 2). </a:t>
             </a:r>
             <a:r>
               <a:rPr lang="en-US" dirty="0"/>
-              <a:t>the three countries, </a:t>
+              <a:t>We selected a</a:t>
             </a:r>
             <a:r>
               <a:rPr lang="en-US" baseline="0" dirty="0"/>
-              <a:t>we made </a:t>
+              <a:t> conic conformal map projection that is </a:t>
             </a:r>
             <a:r>
               <a:rPr lang="en-US" dirty="0"/>
-              <a:t>the</a:t>
+              <a:t>suitable for </a:t>
             </a:r>
             <a:r>
               <a:rPr lang="en-US" baseline="0" dirty="0"/>
-              <a:t> map that can be seen in Figure 2. The user can select the search term by clicking one of the icons displayed in Figure 1. </a:t>
-            </a:r>
-            <a:r>
-              <a:rPr lang="en-GB" dirty="0"/>
-              <a:t>We used the Google data from November 2018 through November 2020 and calculated the Search Trends differences between the first year (11/2018-11/2019) and the second year with COVID-19 impact (11/2019-11/2020)</a:t>
-            </a:r>
-            <a:r>
-              <a:rPr lang="en-US" baseline="0" dirty="0"/>
-              <a:t> The Projection of the map is the Conic Projection, as this projection is good for smaller </a:t>
-            </a:r>
-            <a:r>
-              <a:rPr lang="en-US" dirty="0"/>
-              <a:t>a</a:t>
-            </a:r>
-            <a:r>
-              <a:rPr lang="en-US" baseline="0" dirty="0"/>
-              <a:t>reas, extending from east to west.</a:t>
-            </a:r>
+              <a:t>our area of interest extending from east to west.</a:t>
+            </a:r>
+          </a:p>
+          <a:p>
+            <a:r>
+              <a:rPr lang="en-US" dirty="0">
+                <a:highlight>
+                  <a:srgbClr val="FFFF00"/>
+                </a:highlight>
+              </a:rPr>
+              <a:t>(…)</a:t>
+            </a:r>
+            <a:endParaRPr lang="en-US" baseline="0" dirty="0">
+              <a:highlight>
+                <a:srgbClr val="FFFF00"/>
+              </a:highlight>
+            </a:endParaRPr>
           </a:p>
         </p:txBody>
       </p:sp>
@@ -1715,8 +1706,8 @@
         </p:nvSpPr>
         <p:spPr>
           <a:xfrm>
-            <a:off x="5994001" y="20038392"/>
-            <a:ext cx="4481250" cy="7193608"/>
+            <a:off x="5994001" y="19037300"/>
+            <a:ext cx="4481250" cy="8307012"/>
           </a:xfrm>
         </p:spPr>
         <p:txBody>
@@ -1734,15 +1725,16 @@
             <a:pPr fontAlgn="base"/>
             <a:r>
               <a:rPr lang="en-US" dirty="0"/>
-              <a:t>In the radar chart of Figure 2, the fifteen search terms are displayed. The countries can be selected, and the slider can be played from the first of November 2019. The radar chart </a:t>
+              <a:t>Clicking the navigation button COUNTRY the radar chart pops up comparing the 15 search terms across the countries selected in the dropdown menu (Fig. 3). A timeline animation can be started or the time can be selected individually. N</a:t>
+            </a:r>
+            <a:r>
+              <a:rPr lang="en-GB" dirty="0" err="1"/>
+              <a:t>egative</a:t>
             </a:r>
             <a:r>
               <a:rPr lang="en-GB" dirty="0"/>
-              <a:t>includes negative and positive values indicating a lower or higher search frequency than in the previous year.</a:t>
-            </a:r>
-            <a:endParaRPr lang="en-US" b="1" cap="all" spc="200" dirty="0"/>
-          </a:p>
-          <a:p>
+              <a:t> and positive values indicate lower or higher searches compared to the previous year.</a:t>
+            </a:r>
             <a:endParaRPr lang="en-US" sz="2400" b="1" cap="all" spc="200" dirty="0"/>
           </a:p>
           <a:p>
@@ -1755,20 +1747,21 @@
           <a:p>
             <a:r>
               <a:rPr lang="en-US" dirty="0"/>
-              <a:t>The Search Term data was available on Google Trends data [1]. For the new Covid-19 cases per day we exploited the data from the WHO [2]. </a:t>
-            </a:r>
-            <a:endParaRPr lang="en-US" b="1" dirty="0"/>
-          </a:p>
-          <a:p>
-            <a:pPr>
-              <a:spcBef>
-                <a:spcPts val="2268"/>
-              </a:spcBef>
-            </a:pPr>
-            <a:r>
-              <a:rPr lang="de-AT" dirty="0"/>
+              <a:t>The Search Term data is available on the Google Trends website [1]. </a:t>
+            </a:r>
+            <a:r>
+              <a:rPr lang="en-GB" dirty="0"/>
+              <a:t>We used the Google data from November 2018 to November 2020 and calculated the Search Trends differences between the first year (11/2018-11/2019) and the second year with COVID-19 impact (11/2019-11/2020).</a:t>
+            </a:r>
+            <a:r>
+              <a:rPr lang="en-US" baseline="0" dirty="0"/>
               <a:t> </a:t>
             </a:r>
+            <a:r>
+              <a:rPr lang="en-US" dirty="0"/>
+              <a:t>For the daily COVID-19 cases we used the data from the WHO [2].</a:t>
+            </a:r>
+            <a:endParaRPr lang="de-AT" dirty="0"/>
           </a:p>
         </p:txBody>
       </p:sp>
@@ -1788,8 +1781,8 @@
         </p:nvSpPr>
         <p:spPr>
           <a:xfrm>
-            <a:off x="10908000" y="20038392"/>
-            <a:ext cx="4316831" cy="7193608"/>
+            <a:off x="10908000" y="19037300"/>
+            <a:ext cx="4316831" cy="7629431"/>
           </a:xfrm>
           <a:prstGeom prst="rect">
             <a:avLst/>
@@ -1980,11 +1973,31 @@
           <a:p>
             <a:r>
               <a:rPr lang="en-US" dirty="0"/>
-              <a:t>We have designed the interactive map and radar chart with </a:t>
+              <a:t>The </a:t>
+            </a:r>
+            <a:r>
+              <a:rPr lang="de-DE" dirty="0"/>
+              <a:t>web </a:t>
+            </a:r>
+            <a:r>
+              <a:rPr lang="de-DE" dirty="0" err="1"/>
+              <a:t>application</a:t>
+            </a:r>
+            <a:r>
+              <a:rPr lang="de-DE" dirty="0"/>
+              <a:t> was </a:t>
+            </a:r>
+            <a:r>
+              <a:rPr lang="de-DE" dirty="0" err="1"/>
+              <a:t>designed</a:t>
+            </a:r>
+            <a:r>
+              <a:rPr lang="de-DE" dirty="0"/>
+              <a:t> </a:t>
             </a:r>
             <a:r>
               <a:rPr lang="en-GB" dirty="0"/>
-              <a:t>the interactive map with </a:t>
+              <a:t>with </a:t>
             </a:r>
             <a:r>
               <a:rPr lang="en-GB" dirty="0" err="1"/>
@@ -1992,9 +2005,23 @@
             </a:r>
             <a:r>
               <a:rPr lang="en-GB" dirty="0"/>
-              <a:t>, an interactive graphing library for Python. This is deployed with Dash, another Python library. The data cleaning was done in R.</a:t>
-            </a:r>
-            <a:endParaRPr lang="en-US" dirty="0"/>
+              <a:t>, an interactive graphing library and deployed with Dash. Both are Python libraries. The data cleaning was done in R.</a:t>
+            </a:r>
+          </a:p>
+          <a:p>
+            <a:r>
+              <a:rPr lang="en-GB" dirty="0">
+                <a:highlight>
+                  <a:srgbClr val="FFFF00"/>
+                </a:highlight>
+              </a:rPr>
+              <a:t>html?</a:t>
+            </a:r>
+            <a:endParaRPr lang="en-US" dirty="0">
+              <a:highlight>
+                <a:srgbClr val="FFFF00"/>
+              </a:highlight>
+            </a:endParaRPr>
           </a:p>
           <a:p>
             <a:pPr>
@@ -2010,7 +2037,15 @@
           <a:p>
             <a:r>
               <a:rPr lang="en-US" dirty="0"/>
-              <a:t>As can be seen in the Figures, the search terms changed during the Corona pandemic. Search terms like banana bread and toilet paper increased, while restaurants were searched less often. Here we need another take home message that inspires peeps</a:t>
+              <a:t>As can be seen in the Figures, the search terms changed during the Corona pandemic. Web searches for banana bread and toilet paper increased, while restaurants were searched less often. </a:t>
+            </a:r>
+            <a:r>
+              <a:rPr lang="en-US" dirty="0">
+                <a:highlight>
+                  <a:srgbClr val="FFFF00"/>
+                </a:highlight>
+              </a:rPr>
+              <a:t>Here we need another take home message that inspires peeps</a:t>
             </a:r>
           </a:p>
         </p:txBody>
@@ -2231,7 +2266,7 @@
             </a:r>
             <a:r>
               <a:rPr lang="en-GB" sz="2200" dirty="0"/>
-              <a:t>Google Trends (2020). Google Trends. Retrieved 11 Nov, 2020, </a:t>
+              <a:t>Google Trends (2020). Google Trends. Retrieved Nov 11, 2020, </a:t>
             </a:r>
             <a:r>
               <a:rPr lang="en-GB" sz="2200" u="sng" dirty="0">
@@ -2249,7 +2284,7 @@
             </a:r>
             <a:r>
               <a:rPr lang="en-GB" sz="2200" dirty="0"/>
-              <a:t> World Health Organization (2020). WHO Coronavirus Disease (COVID-19) Dashboard. Retrieved 11 Nov 2020, from </a:t>
+              <a:t> World Health Organization (2020). WHO Coronavirus Disease (COVID-19) Dashboard. Retrieved Nov 11, 2020, from </a:t>
             </a:r>
             <a:r>
               <a:rPr lang="en-GB" sz="2200" u="sng" dirty="0">
@@ -2265,14 +2300,6 @@
               <a:rPr lang="en-GB" sz="3200" dirty="0"/>
             </a:br>
             <a:endParaRPr lang="en-GB" sz="3200" dirty="0"/>
-          </a:p>
-          <a:p>
-            <a:pPr marL="355600" indent="-355600"/>
-            <a:r>
-              <a:rPr lang="en-US" sz="2200" dirty="0"/>
-              <a:t>[5]	Thanks for reading these guidelines. Have fun with designing your poster! </a:t>
-            </a:r>
-            <a:endParaRPr lang="de-AT" sz="2200" dirty="0"/>
           </a:p>
         </p:txBody>
       </p:sp>
@@ -2290,8 +2317,8 @@
         </p:nvSpPr>
         <p:spPr>
           <a:xfrm>
-            <a:off x="5828831" y="12510314"/>
-            <a:ext cx="9396000" cy="830997"/>
+            <a:off x="5828830" y="12510314"/>
+            <a:ext cx="9561170" cy="553998"/>
           </a:xfrm>
           <a:prstGeom prst="rect">
             <a:avLst/>
@@ -2308,7 +2335,7 @@
                 <a:latin typeface="Roboto Condensed Light" pitchFamily="2" charset="0"/>
                 <a:ea typeface="Roboto Condensed Light" pitchFamily="2" charset="0"/>
               </a:rPr>
-              <a:t>Fig. 1 On the left is the map with the search trend data compared to the previous year for one specific search term. In this case, Restaurant is used as search term, for the week of 26 July. On the right it the new COVID-19 cases per day per country displayed.</a:t>
+              <a:t>Fig. 2 Close-up of the FOOD site displaying the map showing the search trend popularity for the term restaurant in the week of July 26. The daily COVID-19 cases are shown on the right.</a:t>
             </a:r>
             <a:endParaRPr lang="de-AT" i="1" dirty="0">
               <a:latin typeface="Roboto Condensed Light" pitchFamily="2" charset="0"/>
@@ -2331,8 +2358,8 @@
         </p:nvSpPr>
         <p:spPr>
           <a:xfrm>
-            <a:off x="5994000" y="18864719"/>
-            <a:ext cx="9396000" cy="553998"/>
+            <a:off x="5994000" y="18526328"/>
+            <a:ext cx="9396000" cy="276999"/>
           </a:xfrm>
           <a:prstGeom prst="rect">
             <a:avLst/>
@@ -2349,9 +2376,22 @@
                 <a:latin typeface="Roboto Condensed Light" pitchFamily="2" charset="0"/>
                 <a:ea typeface="Roboto Condensed Light" pitchFamily="2" charset="0"/>
               </a:rPr>
-              <a:t>Fig. 2 On the left is the radar chart where the all the search terms searches can be compared between the three countries. On the right the….</a:t>
+              <a:t>Fig. 3 Close-up of the COUNTRY site displaying the radar chart and </a:t>
+            </a:r>
+            <a:r>
+              <a:rPr lang="en-US" i="1" dirty="0">
+                <a:highlight>
+                  <a:srgbClr val="FFFF00"/>
+                </a:highlight>
+                <a:latin typeface="Roboto Condensed Light" pitchFamily="2" charset="0"/>
+                <a:ea typeface="Roboto Condensed Light" pitchFamily="2" charset="0"/>
+              </a:rPr>
+              <a:t>...</a:t>
             </a:r>
             <a:endParaRPr lang="de-AT" i="1" dirty="0">
+              <a:highlight>
+                <a:srgbClr val="FFFF00"/>
+              </a:highlight>
               <a:latin typeface="Roboto Condensed Light" pitchFamily="2" charset="0"/>
               <a:ea typeface="Roboto Condensed Light" pitchFamily="2" charset="0"/>
             </a:endParaRPr>
@@ -2380,8 +2420,8 @@
         </p:blipFill>
         <p:spPr>
           <a:xfrm>
-            <a:off x="5828831" y="13451419"/>
-            <a:ext cx="9726336" cy="5413300"/>
+            <a:off x="5828831" y="13296880"/>
+            <a:ext cx="9396000" cy="5229448"/>
           </a:xfrm>
           <a:prstGeom prst="rect">
             <a:avLst/>
@@ -2510,7 +2550,7 @@
                 <a:latin typeface="Roboto Condensed Light" pitchFamily="2" charset="0"/>
                 <a:ea typeface="Roboto Condensed Light" pitchFamily="2" charset="0"/>
               </a:rPr>
-              <a:t>Fig. 1 All possible search trends, visualized with icons</a:t>
+              <a:t>Fig. 1 Search trends visualized by icon buttons</a:t>
             </a:r>
             <a:endParaRPr lang="de-AT" i="1" dirty="0">
               <a:latin typeface="Roboto Condensed Light" pitchFamily="2" charset="0"/>

</xml_diff>

<commit_message>
Edited again, new qr code with improved resolution and updated country section :)
</commit_message>
<xml_diff>
--- a/mapping_project-poster.pptx
+++ b/mapping_project-poster.pptx
@@ -1346,7 +1346,7 @@
         <p:spPr>
           <a:xfrm>
             <a:off x="15822000" y="7019998"/>
-            <a:ext cx="4481624" cy="10052791"/>
+            <a:ext cx="4481624" cy="9706831"/>
           </a:xfrm>
         </p:spPr>
         <p:txBody>
@@ -1496,7 +1496,7 @@
           <a:p>
             <a:r>
               <a:rPr lang="en-US" dirty="0"/>
-              <a:t>Google Search Terms, Google Trends, COVID-19, pandemic, Web Searches</a:t>
+              <a:t>Google Trends, COVID-19, pandemic, Web Searches, WHO</a:t>
             </a:r>
           </a:p>
           <a:p>
@@ -1517,7 +1517,14 @@
           <a:p>
             <a:r>
               <a:rPr lang="en-US" dirty="0"/>
-              <a:t>https://searching-for-the-essentials.herokuapp.com</a:t>
+              <a:t>https://searching-for-the-essentials.</a:t>
+            </a:r>
+            <a:br>
+              <a:rPr lang="en-US" dirty="0"/>
+            </a:br>
+            <a:r>
+              <a:rPr lang="en-US" dirty="0"/>
+              <a:t>herokuapp.com</a:t>
             </a:r>
           </a:p>
         </p:txBody>
@@ -1671,15 +1678,7 @@
             </a:r>
             <a:r>
               <a:rPr lang="en-US" baseline="0" dirty="0"/>
-              <a:t>a higher search frequency during the pandemic while the red circles show a lower search query </a:t>
-            </a:r>
-            <a:r>
-              <a:rPr lang="en-US" strike="sngStrike" baseline="0" dirty="0"/>
-              <a:t>in 2020</a:t>
-            </a:r>
-            <a:r>
-              <a:rPr lang="en-US" baseline="0" dirty="0"/>
-              <a:t>. We chose a</a:t>
+              <a:t>a higher search frequency during the pandemic while the red circles show a lower search query. We chose a</a:t>
             </a:r>
             <a:r>
               <a:rPr lang="en-US" dirty="0"/>
@@ -1703,15 +1702,7 @@
             </a:r>
             <a:r>
               <a:rPr lang="en-US" baseline="0" dirty="0"/>
-              <a:t>our area of interest extending </a:t>
-            </a:r>
-            <a:r>
-              <a:rPr lang="en-US" baseline="0" dirty="0">
-                <a:highlight>
-                  <a:srgbClr val="FFFF00"/>
-                </a:highlight>
-              </a:rPr>
-              <a:t>from east to west.</a:t>
+              <a:t>our area of interest extending from east to west.</a:t>
             </a:r>
           </a:p>
         </p:txBody>
@@ -1734,8 +1725,8 @@
         </p:nvSpPr>
         <p:spPr>
           <a:xfrm>
-            <a:off x="5994001" y="19037301"/>
-            <a:ext cx="4481250" cy="8102599"/>
+            <a:off x="5993812" y="18725962"/>
+            <a:ext cx="4481250" cy="8413938"/>
           </a:xfrm>
         </p:spPr>
         <p:txBody>
@@ -1766,7 +1757,27 @@
             </a:r>
             <a:r>
               <a:rPr lang="en-GB" dirty="0"/>
-              <a:t> and positive values indicate lower or higher searches compared to the year before.</a:t>
+              <a:t> and positive values indicate lower or higher searches compared to the year before. Additional support is given by line plots presenting the evolution of each search term</a:t>
+            </a:r>
+            <a:r>
+              <a:rPr lang="de-DE" dirty="0"/>
+              <a:t> and </a:t>
+            </a:r>
+            <a:r>
+              <a:rPr lang="de-DE" dirty="0" err="1"/>
+              <a:t>the</a:t>
+            </a:r>
+            <a:r>
+              <a:rPr lang="de-DE" dirty="0"/>
+              <a:t> COVID-19 </a:t>
+            </a:r>
+            <a:r>
+              <a:rPr lang="de-DE" dirty="0" err="1"/>
+              <a:t>infection</a:t>
+            </a:r>
+            <a:r>
+              <a:rPr lang="de-DE" dirty="0"/>
+              <a:t> rate.</a:t>
             </a:r>
             <a:endParaRPr lang="en-US" sz="2400" b="1" cap="all" spc="200" dirty="0"/>
           </a:p>
@@ -1785,7 +1796,7 @@
           <a:p>
             <a:r>
               <a:rPr lang="en-GB" dirty="0"/>
-              <a:t>We used the Google Trends data from November 2018 to November 2020 and calculated the differences between the first year (11/2018-11/2019) and the second year with COVID-19 impact (11/2019-11/2020) </a:t>
+              <a:t>We used the Google Trends data from 11/2018 to 11/2020 and calculated the differences between the first and the second year </a:t>
             </a:r>
             <a:r>
               <a:rPr lang="en-US" dirty="0"/>
@@ -1819,8 +1830,8 @@
         </p:nvSpPr>
         <p:spPr>
           <a:xfrm>
-            <a:off x="10908000" y="19037301"/>
-            <a:ext cx="4316831" cy="8102600"/>
+            <a:off x="10907999" y="18725963"/>
+            <a:ext cx="4482000" cy="8413938"/>
           </a:xfrm>
           <a:prstGeom prst="rect">
             <a:avLst/>
@@ -2043,15 +2054,7 @@
             </a:r>
             <a:r>
               <a:rPr lang="en-GB" dirty="0"/>
-              <a:t>, an interactive graphing library and deployed with Dash. Both are Python libraries. The data cleaning was carried out in R. </a:t>
-            </a:r>
-            <a:r>
-              <a:rPr lang="en-GB" dirty="0">
-                <a:highlight>
-                  <a:srgbClr val="FFFF00"/>
-                </a:highlight>
-              </a:rPr>
-              <a:t>What about dash and html?</a:t>
+              <a:t>, an interactive graphing library and deployed with Dash. Both are Python libraries. The data cleaning was carried out in R.</a:t>
             </a:r>
             <a:endParaRPr lang="en-US" dirty="0">
               <a:highlight>
@@ -2073,7 +2076,7 @@
           <a:p>
             <a:r>
               <a:rPr lang="en-US" dirty="0"/>
-              <a:t>Search term popularities noticeably changed during the COVID-19 break-out in 2020. Web searches for banana bread and toilet paper largely increased, while restaurants were searched less often. During the first wave people especially started looking for hand sanitizer and toilet paper, while the search for face masks was staggered for the countries depending on regulations that started to apply at a different time for each country.</a:t>
+              <a:t>The search term popularities noticeably changed during the COVID-19 break-out in 2020. Web searches for banana bread and toilet paper largely increased, while restaurants were searched less often. During the first wave people especially started looking for hand sanitizer and toilet paper, while the search for face masks was staggered for the countries due to regulations starting to apply at different times. All these trends can be further explored with our interactive web map application.</a:t>
             </a:r>
             <a:endParaRPr lang="en-US" dirty="0">
               <a:highlight>
@@ -2350,8 +2353,8 @@
         </p:nvSpPr>
         <p:spPr>
           <a:xfrm>
-            <a:off x="5828830" y="12416299"/>
-            <a:ext cx="9561170" cy="830997"/>
+            <a:off x="5828830" y="12360110"/>
+            <a:ext cx="9561170" cy="553998"/>
           </a:xfrm>
           <a:prstGeom prst="rect">
             <a:avLst/>
@@ -2368,7 +2371,7 @@
                 <a:latin typeface="Roboto Condensed Light" pitchFamily="2" charset="0"/>
                 <a:ea typeface="Roboto Condensed Light" pitchFamily="2" charset="0"/>
               </a:rPr>
-              <a:t>Fig. 2 Close-up of the FOOD section displaying the map showing the search trend popularity for the term restaurant in the week of July 26. The daily COVID-19 cases are shown on the right.</a:t>
+              <a:t>Fig. 2 Close-up of the FOOD section showing the daily COVID-19 cases on the right and the symbol map displaying the search trend popularity for “restaurant” in the week of July 26. </a:t>
             </a:r>
             <a:endParaRPr lang="de-AT" i="1" dirty="0">
               <a:latin typeface="Roboto Condensed Light" pitchFamily="2" charset="0"/>
@@ -2391,7 +2394,7 @@
         </p:nvSpPr>
         <p:spPr>
           <a:xfrm>
-            <a:off x="5994000" y="18527787"/>
+            <a:off x="5911415" y="18282316"/>
             <a:ext cx="9396000" cy="276999"/>
           </a:xfrm>
           <a:prstGeom prst="rect">
@@ -2409,22 +2412,9 @@
                 <a:latin typeface="Roboto Condensed Light" pitchFamily="2" charset="0"/>
                 <a:ea typeface="Roboto Condensed Light" pitchFamily="2" charset="0"/>
               </a:rPr>
-              <a:t>Fig. 3 Close-up of the COUNTRY section displaying the radar chart and </a:t>
-            </a:r>
-            <a:r>
-              <a:rPr lang="en-US" i="1" dirty="0">
-                <a:highlight>
-                  <a:srgbClr val="FFFF00"/>
-                </a:highlight>
-                <a:latin typeface="Roboto Condensed Light" pitchFamily="2" charset="0"/>
-                <a:ea typeface="Roboto Condensed Light" pitchFamily="2" charset="0"/>
-              </a:rPr>
-              <a:t>...</a:t>
+              <a:t>Fig. 3 Close-up of the COUNTRY section displaying the radar chart and the line plots.</a:t>
             </a:r>
             <a:endParaRPr lang="de-AT" i="1" dirty="0">
-              <a:highlight>
-                <a:srgbClr val="FFFF00"/>
-              </a:highlight>
               <a:latin typeface="Roboto Condensed Light" pitchFamily="2" charset="0"/>
               <a:ea typeface="Roboto Condensed Light" pitchFamily="2" charset="0"/>
             </a:endParaRPr>
@@ -2437,6 +2427,76 @@
             <a:extLst>
               <a:ext uri="{FF2B5EF4-FFF2-40B4-BE49-F238E27FC236}">
                 <a16:creationId xmlns:a16="http://schemas.microsoft.com/office/drawing/2014/main" id="{163C4EA7-46E4-C046-8D2D-6E7B57EAA095}"/>
+              </a:ext>
+            </a:extLst>
+          </p:cNvPr>
+          <p:cNvPicPr>
+            <a:picLocks noChangeAspect="1"/>
+          </p:cNvPicPr>
+          <p:nvPr/>
+        </p:nvPicPr>
+        <p:blipFill>
+          <a:blip r:embed="rId4">
+            <a:extLst>
+              <a:ext uri="{28A0092B-C50C-407E-A947-70E740481C1C}">
+                <a14:useLocalDpi xmlns:a14="http://schemas.microsoft.com/office/drawing/2010/main" val="0"/>
+              </a:ext>
+            </a:extLst>
+          </a:blip>
+          <a:srcRect t="2423" b="2423"/>
+          <a:stretch/>
+        </p:blipFill>
+        <p:spPr>
+          <a:xfrm>
+            <a:off x="5911415" y="13052661"/>
+            <a:ext cx="9396000" cy="5063008"/>
+          </a:xfrm>
+          <a:prstGeom prst="rect">
+            <a:avLst/>
+          </a:prstGeom>
+        </p:spPr>
+      </p:pic>
+      <p:pic>
+        <p:nvPicPr>
+          <p:cNvPr id="24" name="Picture 23">
+            <a:extLst>
+              <a:ext uri="{FF2B5EF4-FFF2-40B4-BE49-F238E27FC236}">
+                <a16:creationId xmlns:a16="http://schemas.microsoft.com/office/drawing/2014/main" id="{E0DC7522-E761-9246-B71F-74034DCD1766}"/>
+              </a:ext>
+            </a:extLst>
+          </p:cNvPr>
+          <p:cNvPicPr>
+            <a:picLocks noChangeAspect="1"/>
+          </p:cNvPicPr>
+          <p:nvPr/>
+        </p:nvPicPr>
+        <p:blipFill>
+          <a:blip r:embed="rId5">
+            <a:extLst>
+              <a:ext uri="{28A0092B-C50C-407E-A947-70E740481C1C}">
+                <a14:useLocalDpi xmlns:a14="http://schemas.microsoft.com/office/drawing/2010/main" val="0"/>
+              </a:ext>
+            </a:extLst>
+          </a:blip>
+          <a:srcRect/>
+          <a:stretch/>
+        </p:blipFill>
+        <p:spPr>
+          <a:xfrm>
+            <a:off x="15657580" y="15796135"/>
+            <a:ext cx="2763180" cy="2763180"/>
+          </a:xfrm>
+          <a:prstGeom prst="rect">
+            <a:avLst/>
+          </a:prstGeom>
+        </p:spPr>
+      </p:pic>
+      <p:pic>
+        <p:nvPicPr>
+          <p:cNvPr id="25" name="Picture 24">
+            <a:extLst>
+              <a:ext uri="{FF2B5EF4-FFF2-40B4-BE49-F238E27FC236}">
+                <a16:creationId xmlns:a16="http://schemas.microsoft.com/office/drawing/2014/main" id="{93CA83A4-FD26-5B4C-A0F7-00A93E0061A3}"/>
               </a:ext>
             </a:extLst>
           </p:cNvPr>
@@ -2446,74 +2506,14 @@
           <p:nvPr/>
         </p:nvPicPr>
         <p:blipFill rotWithShape="1">
-          <a:blip r:embed="rId4"/>
-          <a:srcRect t="3183"/>
+          <a:blip r:embed="rId6"/>
+          <a:srcRect t="1068"/>
           <a:stretch/>
         </p:blipFill>
         <p:spPr>
           <a:xfrm>
-            <a:off x="5911415" y="13348522"/>
-            <a:ext cx="9396000" cy="5063008"/>
-          </a:xfrm>
-          <a:prstGeom prst="rect">
-            <a:avLst/>
-          </a:prstGeom>
-        </p:spPr>
-      </p:pic>
-      <p:pic>
-        <p:nvPicPr>
-          <p:cNvPr id="24" name="Picture 23">
-            <a:extLst>
-              <a:ext uri="{FF2B5EF4-FFF2-40B4-BE49-F238E27FC236}">
-                <a16:creationId xmlns:a16="http://schemas.microsoft.com/office/drawing/2014/main" id="{E0DC7522-E761-9246-B71F-74034DCD1766}"/>
-              </a:ext>
-            </a:extLst>
-          </p:cNvPr>
-          <p:cNvPicPr>
-            <a:picLocks noChangeAspect="1"/>
-          </p:cNvPicPr>
-          <p:nvPr/>
-        </p:nvPicPr>
-        <p:blipFill>
-          <a:blip r:embed="rId5"/>
-          <a:stretch>
-            <a:fillRect/>
-          </a:stretch>
-        </p:blipFill>
-        <p:spPr>
-          <a:xfrm>
-            <a:off x="15822000" y="17072790"/>
-            <a:ext cx="4481625" cy="4514578"/>
-          </a:xfrm>
-          <a:prstGeom prst="rect">
-            <a:avLst/>
-          </a:prstGeom>
-        </p:spPr>
-      </p:pic>
-      <p:pic>
-        <p:nvPicPr>
-          <p:cNvPr id="25" name="Picture 24">
-            <a:extLst>
-              <a:ext uri="{FF2B5EF4-FFF2-40B4-BE49-F238E27FC236}">
-                <a16:creationId xmlns:a16="http://schemas.microsoft.com/office/drawing/2014/main" id="{93CA83A4-FD26-5B4C-A0F7-00A93E0061A3}"/>
-              </a:ext>
-            </a:extLst>
-          </p:cNvPr>
-          <p:cNvPicPr>
-            <a:picLocks noChangeAspect="1"/>
-          </p:cNvPicPr>
-          <p:nvPr/>
-        </p:nvPicPr>
-        <p:blipFill>
-          <a:blip r:embed="rId6"/>
-          <a:stretch>
-            <a:fillRect/>
-          </a:stretch>
-        </p:blipFill>
-        <p:spPr>
-          <a:xfrm>
-            <a:off x="5828831" y="7020000"/>
-            <a:ext cx="9396000" cy="5257746"/>
+            <a:off x="5828831" y="7019998"/>
+            <a:ext cx="9396000" cy="5201559"/>
           </a:xfrm>
           <a:prstGeom prst="rect">
             <a:avLst/>

</xml_diff>

<commit_message>
small changed to tools and data paragraph
</commit_message>
<xml_diff>
--- a/mapping_project-poster.pptx
+++ b/mapping_project-poster.pptx
@@ -4,6 +4,9 @@
   <p:sldMasterIdLst>
     <p:sldMasterId id="2147483660" r:id="rId1"/>
   </p:sldMasterIdLst>
+  <p:notesMasterIdLst>
+    <p:notesMasterId r:id="rId3"/>
+  </p:notesMasterIdLst>
   <p:sldIdLst>
     <p:sldId id="256" r:id="rId2"/>
   </p:sldIdLst>
@@ -110,6 +113,440 @@
     </p:ext>
   </p:extLst>
 </p:presentation>
+</file>
+
+<file path=ppt/notesMasters/notesMaster1.xml><?xml version="1.0" encoding="utf-8"?>
+<p:notesMaster xmlns:a="http://schemas.openxmlformats.org/drawingml/2006/main" xmlns:r="http://schemas.openxmlformats.org/officeDocument/2006/relationships" xmlns:p="http://schemas.openxmlformats.org/presentationml/2006/main">
+  <p:cSld>
+    <p:bg>
+      <p:bgRef idx="1001">
+        <a:schemeClr val="bg1"/>
+      </p:bgRef>
+    </p:bg>
+    <p:spTree>
+      <p:nvGrpSpPr>
+        <p:cNvPr id="1" name=""/>
+        <p:cNvGrpSpPr/>
+        <p:nvPr/>
+      </p:nvGrpSpPr>
+      <p:grpSpPr>
+        <a:xfrm>
+          <a:off x="0" y="0"/>
+          <a:ext cx="0" cy="0"/>
+          <a:chOff x="0" y="0"/>
+          <a:chExt cx="0" cy="0"/>
+        </a:xfrm>
+      </p:grpSpPr>
+      <p:sp>
+        <p:nvSpPr>
+          <p:cNvPr id="2" name="Header Placeholder 1"/>
+          <p:cNvSpPr>
+            <a:spLocks noGrp="1"/>
+          </p:cNvSpPr>
+          <p:nvPr>
+            <p:ph type="hdr" sz="quarter"/>
+          </p:nvPr>
+        </p:nvSpPr>
+        <p:spPr>
+          <a:xfrm>
+            <a:off x="0" y="0"/>
+            <a:ext cx="2971800" cy="458788"/>
+          </a:xfrm>
+          <a:prstGeom prst="rect">
+            <a:avLst/>
+          </a:prstGeom>
+        </p:spPr>
+        <p:txBody>
+          <a:bodyPr vert="horz" lIns="91440" tIns="45720" rIns="91440" bIns="45720" rtlCol="0"/>
+          <a:lstStyle>
+            <a:lvl1pPr algn="l">
+              <a:defRPr sz="1200"/>
+            </a:lvl1pPr>
+          </a:lstStyle>
+          <a:p>
+            <a:endParaRPr lang="en-NL"/>
+          </a:p>
+        </p:txBody>
+      </p:sp>
+      <p:sp>
+        <p:nvSpPr>
+          <p:cNvPr id="3" name="Date Placeholder 2"/>
+          <p:cNvSpPr>
+            <a:spLocks noGrp="1"/>
+          </p:cNvSpPr>
+          <p:nvPr>
+            <p:ph type="dt" idx="1"/>
+          </p:nvPr>
+        </p:nvSpPr>
+        <p:spPr>
+          <a:xfrm>
+            <a:off x="3884613" y="0"/>
+            <a:ext cx="2971800" cy="458788"/>
+          </a:xfrm>
+          <a:prstGeom prst="rect">
+            <a:avLst/>
+          </a:prstGeom>
+        </p:spPr>
+        <p:txBody>
+          <a:bodyPr vert="horz" lIns="91440" tIns="45720" rIns="91440" bIns="45720" rtlCol="0"/>
+          <a:lstStyle>
+            <a:lvl1pPr algn="r">
+              <a:defRPr sz="1200"/>
+            </a:lvl1pPr>
+          </a:lstStyle>
+          <a:p>
+            <a:fld id="{0E5820E2-07A4-7E46-B940-ED06D469D0A9}" type="datetimeFigureOut">
+              <a:rPr lang="en-NL" smtClean="0"/>
+              <a:t>31/01/2021</a:t>
+            </a:fld>
+            <a:endParaRPr lang="en-NL"/>
+          </a:p>
+        </p:txBody>
+      </p:sp>
+      <p:sp>
+        <p:nvSpPr>
+          <p:cNvPr id="4" name="Slide Image Placeholder 3"/>
+          <p:cNvSpPr>
+            <a:spLocks noGrp="1" noRot="1" noChangeAspect="1"/>
+          </p:cNvSpPr>
+          <p:nvPr>
+            <p:ph type="sldImg" idx="2"/>
+          </p:nvPr>
+        </p:nvSpPr>
+        <p:spPr>
+          <a:xfrm>
+            <a:off x="2338388" y="1143000"/>
+            <a:ext cx="2181225" cy="3086100"/>
+          </a:xfrm>
+          <a:prstGeom prst="rect">
+            <a:avLst/>
+          </a:prstGeom>
+          <a:noFill/>
+          <a:ln w="12700">
+            <a:solidFill>
+              <a:prstClr val="black"/>
+            </a:solidFill>
+          </a:ln>
+        </p:spPr>
+        <p:txBody>
+          <a:bodyPr vert="horz" lIns="91440" tIns="45720" rIns="91440" bIns="45720" rtlCol="0" anchor="ctr"/>
+          <a:lstStyle/>
+          <a:p>
+            <a:endParaRPr lang="en-NL"/>
+          </a:p>
+        </p:txBody>
+      </p:sp>
+      <p:sp>
+        <p:nvSpPr>
+          <p:cNvPr id="5" name="Notes Placeholder 4"/>
+          <p:cNvSpPr>
+            <a:spLocks noGrp="1"/>
+          </p:cNvSpPr>
+          <p:nvPr>
+            <p:ph type="body" sz="quarter" idx="3"/>
+          </p:nvPr>
+        </p:nvSpPr>
+        <p:spPr>
+          <a:xfrm>
+            <a:off x="685800" y="4400550"/>
+            <a:ext cx="5486400" cy="3600450"/>
+          </a:xfrm>
+          <a:prstGeom prst="rect">
+            <a:avLst/>
+          </a:prstGeom>
+        </p:spPr>
+        <p:txBody>
+          <a:bodyPr vert="horz" lIns="91440" tIns="45720" rIns="91440" bIns="45720" rtlCol="0"/>
+          <a:lstStyle/>
+          <a:p>
+            <a:pPr lvl="0"/>
+            <a:r>
+              <a:rPr lang="en-GB"/>
+              <a:t>Click to edit Master text styles</a:t>
+            </a:r>
+          </a:p>
+          <a:p>
+            <a:pPr lvl="1"/>
+            <a:r>
+              <a:rPr lang="en-GB"/>
+              <a:t>Second level</a:t>
+            </a:r>
+          </a:p>
+          <a:p>
+            <a:pPr lvl="2"/>
+            <a:r>
+              <a:rPr lang="en-GB"/>
+              <a:t>Third level</a:t>
+            </a:r>
+          </a:p>
+          <a:p>
+            <a:pPr lvl="3"/>
+            <a:r>
+              <a:rPr lang="en-GB"/>
+              <a:t>Fourth level</a:t>
+            </a:r>
+          </a:p>
+          <a:p>
+            <a:pPr lvl="4"/>
+            <a:r>
+              <a:rPr lang="en-GB"/>
+              <a:t>Fifth level</a:t>
+            </a:r>
+            <a:endParaRPr lang="en-NL"/>
+          </a:p>
+        </p:txBody>
+      </p:sp>
+      <p:sp>
+        <p:nvSpPr>
+          <p:cNvPr id="6" name="Footer Placeholder 5"/>
+          <p:cNvSpPr>
+            <a:spLocks noGrp="1"/>
+          </p:cNvSpPr>
+          <p:nvPr>
+            <p:ph type="ftr" sz="quarter" idx="4"/>
+          </p:nvPr>
+        </p:nvSpPr>
+        <p:spPr>
+          <a:xfrm>
+            <a:off x="0" y="8685213"/>
+            <a:ext cx="2971800" cy="458787"/>
+          </a:xfrm>
+          <a:prstGeom prst="rect">
+            <a:avLst/>
+          </a:prstGeom>
+        </p:spPr>
+        <p:txBody>
+          <a:bodyPr vert="horz" lIns="91440" tIns="45720" rIns="91440" bIns="45720" rtlCol="0" anchor="b"/>
+          <a:lstStyle>
+            <a:lvl1pPr algn="l">
+              <a:defRPr sz="1200"/>
+            </a:lvl1pPr>
+          </a:lstStyle>
+          <a:p>
+            <a:endParaRPr lang="en-NL"/>
+          </a:p>
+        </p:txBody>
+      </p:sp>
+      <p:sp>
+        <p:nvSpPr>
+          <p:cNvPr id="7" name="Slide Number Placeholder 6"/>
+          <p:cNvSpPr>
+            <a:spLocks noGrp="1"/>
+          </p:cNvSpPr>
+          <p:nvPr>
+            <p:ph type="sldNum" sz="quarter" idx="5"/>
+          </p:nvPr>
+        </p:nvSpPr>
+        <p:spPr>
+          <a:xfrm>
+            <a:off x="3884613" y="8685213"/>
+            <a:ext cx="2971800" cy="458787"/>
+          </a:xfrm>
+          <a:prstGeom prst="rect">
+            <a:avLst/>
+          </a:prstGeom>
+        </p:spPr>
+        <p:txBody>
+          <a:bodyPr vert="horz" lIns="91440" tIns="45720" rIns="91440" bIns="45720" rtlCol="0" anchor="b"/>
+          <a:lstStyle>
+            <a:lvl1pPr algn="r">
+              <a:defRPr sz="1200"/>
+            </a:lvl1pPr>
+          </a:lstStyle>
+          <a:p>
+            <a:fld id="{01B03D1D-E699-7A42-AAF2-6CB121A05637}" type="slidenum">
+              <a:rPr lang="en-NL" smtClean="0"/>
+              <a:t>‹#›</a:t>
+            </a:fld>
+            <a:endParaRPr lang="en-NL"/>
+          </a:p>
+        </p:txBody>
+      </p:sp>
+    </p:spTree>
+    <p:extLst>
+      <p:ext uri="{BB962C8B-B14F-4D97-AF65-F5344CB8AC3E}">
+        <p14:creationId xmlns:p14="http://schemas.microsoft.com/office/powerpoint/2010/main" val="350908513"/>
+      </p:ext>
+    </p:extLst>
+  </p:cSld>
+  <p:clrMap bg1="lt1" tx1="dk1" bg2="lt2" tx2="dk2" accent1="accent1" accent2="accent2" accent3="accent3" accent4="accent4" accent5="accent5" accent6="accent6" hlink="hlink" folHlink="folHlink"/>
+  <p:notesStyle>
+    <a:lvl1pPr marL="0" algn="l" defTabSz="914400" rtl="0" eaLnBrk="1" latinLnBrk="0" hangingPunct="1">
+      <a:defRPr sz="1200" kern="1200">
+        <a:solidFill>
+          <a:schemeClr val="tx1"/>
+        </a:solidFill>
+        <a:latin typeface="+mn-lt"/>
+        <a:ea typeface="+mn-ea"/>
+        <a:cs typeface="+mn-cs"/>
+      </a:defRPr>
+    </a:lvl1pPr>
+    <a:lvl2pPr marL="457200" algn="l" defTabSz="914400" rtl="0" eaLnBrk="1" latinLnBrk="0" hangingPunct="1">
+      <a:defRPr sz="1200" kern="1200">
+        <a:solidFill>
+          <a:schemeClr val="tx1"/>
+        </a:solidFill>
+        <a:latin typeface="+mn-lt"/>
+        <a:ea typeface="+mn-ea"/>
+        <a:cs typeface="+mn-cs"/>
+      </a:defRPr>
+    </a:lvl2pPr>
+    <a:lvl3pPr marL="914400" algn="l" defTabSz="914400" rtl="0" eaLnBrk="1" latinLnBrk="0" hangingPunct="1">
+      <a:defRPr sz="1200" kern="1200">
+        <a:solidFill>
+          <a:schemeClr val="tx1"/>
+        </a:solidFill>
+        <a:latin typeface="+mn-lt"/>
+        <a:ea typeface="+mn-ea"/>
+        <a:cs typeface="+mn-cs"/>
+      </a:defRPr>
+    </a:lvl3pPr>
+    <a:lvl4pPr marL="1371600" algn="l" defTabSz="914400" rtl="0" eaLnBrk="1" latinLnBrk="0" hangingPunct="1">
+      <a:defRPr sz="1200" kern="1200">
+        <a:solidFill>
+          <a:schemeClr val="tx1"/>
+        </a:solidFill>
+        <a:latin typeface="+mn-lt"/>
+        <a:ea typeface="+mn-ea"/>
+        <a:cs typeface="+mn-cs"/>
+      </a:defRPr>
+    </a:lvl4pPr>
+    <a:lvl5pPr marL="1828800" algn="l" defTabSz="914400" rtl="0" eaLnBrk="1" latinLnBrk="0" hangingPunct="1">
+      <a:defRPr sz="1200" kern="1200">
+        <a:solidFill>
+          <a:schemeClr val="tx1"/>
+        </a:solidFill>
+        <a:latin typeface="+mn-lt"/>
+        <a:ea typeface="+mn-ea"/>
+        <a:cs typeface="+mn-cs"/>
+      </a:defRPr>
+    </a:lvl5pPr>
+    <a:lvl6pPr marL="2286000" algn="l" defTabSz="914400" rtl="0" eaLnBrk="1" latinLnBrk="0" hangingPunct="1">
+      <a:defRPr sz="1200" kern="1200">
+        <a:solidFill>
+          <a:schemeClr val="tx1"/>
+        </a:solidFill>
+        <a:latin typeface="+mn-lt"/>
+        <a:ea typeface="+mn-ea"/>
+        <a:cs typeface="+mn-cs"/>
+      </a:defRPr>
+    </a:lvl6pPr>
+    <a:lvl7pPr marL="2743200" algn="l" defTabSz="914400" rtl="0" eaLnBrk="1" latinLnBrk="0" hangingPunct="1">
+      <a:defRPr sz="1200" kern="1200">
+        <a:solidFill>
+          <a:schemeClr val="tx1"/>
+        </a:solidFill>
+        <a:latin typeface="+mn-lt"/>
+        <a:ea typeface="+mn-ea"/>
+        <a:cs typeface="+mn-cs"/>
+      </a:defRPr>
+    </a:lvl7pPr>
+    <a:lvl8pPr marL="3200400" algn="l" defTabSz="914400" rtl="0" eaLnBrk="1" latinLnBrk="0" hangingPunct="1">
+      <a:defRPr sz="1200" kern="1200">
+        <a:solidFill>
+          <a:schemeClr val="tx1"/>
+        </a:solidFill>
+        <a:latin typeface="+mn-lt"/>
+        <a:ea typeface="+mn-ea"/>
+        <a:cs typeface="+mn-cs"/>
+      </a:defRPr>
+    </a:lvl8pPr>
+    <a:lvl9pPr marL="3657600" algn="l" defTabSz="914400" rtl="0" eaLnBrk="1" latinLnBrk="0" hangingPunct="1">
+      <a:defRPr sz="1200" kern="1200">
+        <a:solidFill>
+          <a:schemeClr val="tx1"/>
+        </a:solidFill>
+        <a:latin typeface="+mn-lt"/>
+        <a:ea typeface="+mn-ea"/>
+        <a:cs typeface="+mn-cs"/>
+      </a:defRPr>
+    </a:lvl9pPr>
+  </p:notesStyle>
+</p:notesMaster>
+</file>
+
+<file path=ppt/notesSlides/notesSlide1.xml><?xml version="1.0" encoding="utf-8"?>
+<p:notes xmlns:a="http://schemas.openxmlformats.org/drawingml/2006/main" xmlns:r="http://schemas.openxmlformats.org/officeDocument/2006/relationships" xmlns:p="http://schemas.openxmlformats.org/presentationml/2006/main">
+  <p:cSld>
+    <p:spTree>
+      <p:nvGrpSpPr>
+        <p:cNvPr id="1" name=""/>
+        <p:cNvGrpSpPr/>
+        <p:nvPr/>
+      </p:nvGrpSpPr>
+      <p:grpSpPr>
+        <a:xfrm>
+          <a:off x="0" y="0"/>
+          <a:ext cx="0" cy="0"/>
+          <a:chOff x="0" y="0"/>
+          <a:chExt cx="0" cy="0"/>
+        </a:xfrm>
+      </p:grpSpPr>
+      <p:sp>
+        <p:nvSpPr>
+          <p:cNvPr id="2" name="Slide Image Placeholder 1"/>
+          <p:cNvSpPr>
+            <a:spLocks noGrp="1" noRot="1" noChangeAspect="1"/>
+          </p:cNvSpPr>
+          <p:nvPr>
+            <p:ph type="sldImg"/>
+          </p:nvPr>
+        </p:nvSpPr>
+        <p:spPr/>
+      </p:sp>
+      <p:sp>
+        <p:nvSpPr>
+          <p:cNvPr id="3" name="Notes Placeholder 2"/>
+          <p:cNvSpPr>
+            <a:spLocks noGrp="1"/>
+          </p:cNvSpPr>
+          <p:nvPr>
+            <p:ph type="body" idx="1"/>
+          </p:nvPr>
+        </p:nvSpPr>
+        <p:spPr/>
+        <p:txBody>
+          <a:bodyPr/>
+          <a:lstStyle/>
+          <a:p>
+            <a:endParaRPr lang="en-NL" dirty="0"/>
+          </a:p>
+        </p:txBody>
+      </p:sp>
+      <p:sp>
+        <p:nvSpPr>
+          <p:cNvPr id="4" name="Slide Number Placeholder 3"/>
+          <p:cNvSpPr>
+            <a:spLocks noGrp="1"/>
+          </p:cNvSpPr>
+          <p:nvPr>
+            <p:ph type="sldNum" sz="quarter" idx="5"/>
+          </p:nvPr>
+        </p:nvSpPr>
+        <p:spPr/>
+        <p:txBody>
+          <a:bodyPr/>
+          <a:lstStyle/>
+          <a:p>
+            <a:fld id="{01B03D1D-E699-7A42-AAF2-6CB121A05637}" type="slidenum">
+              <a:rPr lang="en-NL" smtClean="0"/>
+              <a:t>1</a:t>
+            </a:fld>
+            <a:endParaRPr lang="en-NL"/>
+          </a:p>
+        </p:txBody>
+      </p:sp>
+    </p:spTree>
+    <p:extLst>
+      <p:ext uri="{BB962C8B-B14F-4D97-AF65-F5344CB8AC3E}">
+        <p14:creationId xmlns:p14="http://schemas.microsoft.com/office/powerpoint/2010/main" val="4092213360"/>
+      </p:ext>
+    </p:extLst>
+  </p:cSld>
+  <p:clrMapOvr>
+    <a:masterClrMapping/>
+  </p:clrMapOvr>
+</p:notes>
 </file>
 
 <file path=ppt/slideLayouts/slideLayout1.xml><?xml version="1.0" encoding="utf-8"?>
@@ -1726,7 +2163,7 @@
         <p:spPr>
           <a:xfrm>
             <a:off x="5993812" y="18725962"/>
-            <a:ext cx="4481250" cy="8413938"/>
+            <a:ext cx="4481250" cy="8659144"/>
           </a:xfrm>
         </p:spPr>
         <p:txBody>
@@ -1796,7 +2233,7 @@
           <a:p>
             <a:r>
               <a:rPr lang="en-GB" dirty="0"/>
-              <a:t>We used the Google Trends data from 11/2018 to 11/2020 and calculated the differences between the first and the second year </a:t>
+              <a:t>We used the Google Trends data from 1/2019 to 11/2020 and calculated the differences between the first and the second year </a:t>
             </a:r>
             <a:r>
               <a:rPr lang="en-US" dirty="0"/>
@@ -1808,7 +2245,7 @@
             </a:r>
             <a:r>
               <a:rPr lang="en-US" dirty="0"/>
-              <a:t>For the daily COVID-19 cases we used the data from the WHO [2].</a:t>
+              <a:t>For the daily COVID-19 cases we used the data from the WHO [2]. The WHO data starts on 1/2020.</a:t>
             </a:r>
             <a:endParaRPr lang="de-AT" dirty="0"/>
           </a:p>
@@ -1830,8 +2267,8 @@
         </p:nvSpPr>
         <p:spPr>
           <a:xfrm>
-            <a:off x="10907999" y="18725963"/>
-            <a:ext cx="4482000" cy="8413938"/>
+            <a:off x="10907999" y="18725962"/>
+            <a:ext cx="4482000" cy="8659145"/>
           </a:xfrm>
           <a:prstGeom prst="rect">
             <a:avLst/>
@@ -1839,7 +2276,7 @@
         </p:spPr>
         <p:txBody>
           <a:bodyPr vert="horz" lIns="0" tIns="0" rIns="0" bIns="0" rtlCol="0">
-            <a:normAutofit/>
+            <a:normAutofit fontScale="92500"/>
           </a:bodyPr>
           <a:lstStyle>
             <a:lvl1pPr marL="0" indent="0" algn="just" defTabSz="2138324" rtl="0" eaLnBrk="1" latinLnBrk="0" hangingPunct="1">
@@ -2015,52 +2452,48 @@
               </a:spcBef>
             </a:pPr>
             <a:r>
-              <a:rPr lang="en-US" sz="2800" b="1" cap="all" spc="200" dirty="0"/>
+              <a:rPr lang="en-US" sz="3000" b="1" cap="all" spc="200" dirty="0"/>
               <a:t>Tools</a:t>
             </a:r>
           </a:p>
           <a:p>
             <a:r>
-              <a:rPr lang="en-US" dirty="0"/>
-              <a:t>The </a:t>
-            </a:r>
-            <a:r>
-              <a:rPr lang="de-DE" dirty="0"/>
+              <a:rPr lang="en-US" sz="2400" dirty="0"/>
+              <a:t>The interactive </a:t>
+            </a:r>
+            <a:r>
+              <a:rPr lang="de-DE" sz="2400" dirty="0"/>
               <a:t>web </a:t>
             </a:r>
             <a:r>
-              <a:rPr lang="de-DE" dirty="0" err="1"/>
+              <a:rPr lang="de-DE" sz="2400" dirty="0" err="1"/>
               <a:t>application</a:t>
             </a:r>
             <a:r>
-              <a:rPr lang="de-DE" dirty="0"/>
+              <a:rPr lang="de-DE" sz="2400" dirty="0"/>
               <a:t> was </a:t>
             </a:r>
             <a:r>
-              <a:rPr lang="de-DE" dirty="0" err="1"/>
+              <a:rPr lang="de-DE" sz="2400" dirty="0" err="1"/>
               <a:t>designed</a:t>
             </a:r>
             <a:r>
-              <a:rPr lang="de-DE" dirty="0"/>
+              <a:rPr lang="de-DE" sz="2400" dirty="0"/>
               <a:t> </a:t>
             </a:r>
             <a:r>
-              <a:rPr lang="en-GB" dirty="0"/>
+              <a:rPr lang="en-GB" sz="2400" dirty="0"/>
               <a:t>with </a:t>
             </a:r>
             <a:r>
-              <a:rPr lang="en-GB" dirty="0" err="1"/>
+              <a:rPr lang="en-GB" sz="2400" dirty="0" err="1"/>
               <a:t>Plotly</a:t>
             </a:r>
             <a:r>
-              <a:rPr lang="en-GB" dirty="0"/>
-              <a:t>, an interactive graphing library and deployed with Dash. Both are Python libraries. The data cleaning was carried out in R.</a:t>
-            </a:r>
-            <a:endParaRPr lang="en-US" dirty="0">
-              <a:highlight>
-                <a:srgbClr val="FFFF00"/>
-              </a:highlight>
-            </a:endParaRPr>
+              <a:rPr lang="en-GB" sz="2400" dirty="0"/>
+              <a:t>, a scientific graphing Python library. Dash, an open-source Python framework was used for building and deploying the application.</a:t>
+            </a:r>
+            <a:endParaRPr lang="en-US" sz="2400" dirty="0"/>
           </a:p>
           <a:p>
             <a:pPr>
@@ -2069,20 +2502,15 @@
               </a:spcBef>
             </a:pPr>
             <a:r>
-              <a:rPr lang="en-US" sz="2800" b="1" cap="all" spc="200" dirty="0"/>
+              <a:rPr lang="en-US" sz="3000" b="1" cap="all" spc="200" dirty="0"/>
               <a:t>Conclusion</a:t>
             </a:r>
           </a:p>
           <a:p>
             <a:r>
-              <a:rPr lang="en-US" dirty="0"/>
+              <a:rPr lang="en-US" sz="2400" dirty="0"/>
               <a:t>The search term popularities noticeably changed during the COVID-19 break-out in 2020. Web searches for banana bread and toilet paper largely increased, while restaurants were searched less often. During the first wave people especially started looking for hand sanitizer and toilet paper, while the search for face masks was staggered for the countries due to regulations starting to apply at different times. All these trends can be further explored with our interactive web map application.</a:t>
             </a:r>
-            <a:endParaRPr lang="en-US" dirty="0">
-              <a:highlight>
-                <a:srgbClr val="FFFF00"/>
-              </a:highlight>
-            </a:endParaRPr>
           </a:p>
         </p:txBody>
       </p:sp>
@@ -2306,7 +2734,7 @@
             </a:r>
             <a:r>
               <a:rPr lang="en-GB" sz="2200" u="sng" dirty="0">
-                <a:hlinkClick r:id="rId2"/>
+                <a:hlinkClick r:id="rId3"/>
               </a:rPr>
               <a:t>https://trends.google.com/trends/?geo=US</a:t>
             </a:r>
@@ -2324,7 +2752,7 @@
             </a:r>
             <a:r>
               <a:rPr lang="en-GB" sz="2200" u="sng" dirty="0">
-                <a:hlinkClick r:id="rId3"/>
+                <a:hlinkClick r:id="rId4"/>
               </a:rPr>
               <a:t>https://covid19.who.int/</a:t>
             </a:r>
@@ -2332,10 +2760,6 @@
               <a:rPr lang="en-GB" sz="2200" dirty="0"/>
               <a:t> </a:t>
             </a:r>
-            <a:br>
-              <a:rPr lang="en-GB" sz="3200" dirty="0"/>
-            </a:br>
-            <a:endParaRPr lang="en-GB" sz="3200" dirty="0"/>
           </a:p>
         </p:txBody>
       </p:sp>
@@ -2427,41 +2851,6 @@
             <a:extLst>
               <a:ext uri="{FF2B5EF4-FFF2-40B4-BE49-F238E27FC236}">
                 <a16:creationId xmlns:a16="http://schemas.microsoft.com/office/drawing/2014/main" id="{163C4EA7-46E4-C046-8D2D-6E7B57EAA095}"/>
-              </a:ext>
-            </a:extLst>
-          </p:cNvPr>
-          <p:cNvPicPr>
-            <a:picLocks noChangeAspect="1"/>
-          </p:cNvPicPr>
-          <p:nvPr/>
-        </p:nvPicPr>
-        <p:blipFill>
-          <a:blip r:embed="rId4">
-            <a:extLst>
-              <a:ext uri="{28A0092B-C50C-407E-A947-70E740481C1C}">
-                <a14:useLocalDpi xmlns:a14="http://schemas.microsoft.com/office/drawing/2010/main" val="0"/>
-              </a:ext>
-            </a:extLst>
-          </a:blip>
-          <a:srcRect t="2423" b="2423"/>
-          <a:stretch/>
-        </p:blipFill>
-        <p:spPr>
-          <a:xfrm>
-            <a:off x="5911415" y="13052661"/>
-            <a:ext cx="9396000" cy="5063008"/>
-          </a:xfrm>
-          <a:prstGeom prst="rect">
-            <a:avLst/>
-          </a:prstGeom>
-        </p:spPr>
-      </p:pic>
-      <p:pic>
-        <p:nvPicPr>
-          <p:cNvPr id="24" name="Picture 23">
-            <a:extLst>
-              <a:ext uri="{FF2B5EF4-FFF2-40B4-BE49-F238E27FC236}">
-                <a16:creationId xmlns:a16="http://schemas.microsoft.com/office/drawing/2014/main" id="{E0DC7522-E761-9246-B71F-74034DCD1766}"/>
               </a:ext>
             </a:extLst>
           </p:cNvPr>
@@ -2478,6 +2867,41 @@
               </a:ext>
             </a:extLst>
           </a:blip>
+          <a:srcRect t="2423" b="2423"/>
+          <a:stretch/>
+        </p:blipFill>
+        <p:spPr>
+          <a:xfrm>
+            <a:off x="5911415" y="13052661"/>
+            <a:ext cx="9396000" cy="5063008"/>
+          </a:xfrm>
+          <a:prstGeom prst="rect">
+            <a:avLst/>
+          </a:prstGeom>
+        </p:spPr>
+      </p:pic>
+      <p:pic>
+        <p:nvPicPr>
+          <p:cNvPr id="24" name="Picture 23">
+            <a:extLst>
+              <a:ext uri="{FF2B5EF4-FFF2-40B4-BE49-F238E27FC236}">
+                <a16:creationId xmlns:a16="http://schemas.microsoft.com/office/drawing/2014/main" id="{E0DC7522-E761-9246-B71F-74034DCD1766}"/>
+              </a:ext>
+            </a:extLst>
+          </p:cNvPr>
+          <p:cNvPicPr>
+            <a:picLocks noChangeAspect="1"/>
+          </p:cNvPicPr>
+          <p:nvPr/>
+        </p:nvPicPr>
+        <p:blipFill>
+          <a:blip r:embed="rId6">
+            <a:extLst>
+              <a:ext uri="{28A0092B-C50C-407E-A947-70E740481C1C}">
+                <a14:useLocalDpi xmlns:a14="http://schemas.microsoft.com/office/drawing/2010/main" val="0"/>
+              </a:ext>
+            </a:extLst>
+          </a:blip>
           <a:srcRect/>
           <a:stretch/>
         </p:blipFill>
@@ -2506,7 +2930,7 @@
           <p:nvPr/>
         </p:nvPicPr>
         <p:blipFill rotWithShape="1">
-          <a:blip r:embed="rId6"/>
+          <a:blip r:embed="rId7"/>
           <a:srcRect t="1068"/>
           <a:stretch/>
         </p:blipFill>
@@ -2535,14 +2959,14 @@
           <p:nvPr/>
         </p:nvPicPr>
         <p:blipFill>
-          <a:blip r:embed="rId7"/>
+          <a:blip r:embed="rId8"/>
           <a:stretch>
             <a:fillRect/>
           </a:stretch>
         </p:blipFill>
         <p:spPr>
           <a:xfrm>
-            <a:off x="1079625" y="24226409"/>
+            <a:off x="1079434" y="24097938"/>
             <a:ext cx="4482001" cy="2246688"/>
           </a:xfrm>
           <a:prstGeom prst="rect">
@@ -2564,7 +2988,7 @@
         </p:nvSpPr>
         <p:spPr>
           <a:xfrm>
-            <a:off x="1079625" y="26585902"/>
+            <a:off x="1079621" y="26497017"/>
             <a:ext cx="4481625" cy="553998"/>
           </a:xfrm>
           <a:prstGeom prst="rect">
@@ -2863,4 +3287,299 @@
     </a:ext>
   </a:extLst>
 </a:theme>
+</file>
+
+<file path=ppt/theme/theme2.xml><?xml version="1.0" encoding="utf-8"?>
+<a:theme xmlns:a="http://schemas.openxmlformats.org/drawingml/2006/main" name="Office Theme">
+  <a:themeElements>
+    <a:clrScheme name="Office">
+      <a:dk1>
+        <a:sysClr val="windowText" lastClr="000000"/>
+      </a:dk1>
+      <a:lt1>
+        <a:sysClr val="window" lastClr="FFFFFF"/>
+      </a:lt1>
+      <a:dk2>
+        <a:srgbClr val="44546A"/>
+      </a:dk2>
+      <a:lt2>
+        <a:srgbClr val="E7E6E6"/>
+      </a:lt2>
+      <a:accent1>
+        <a:srgbClr val="4472C4"/>
+      </a:accent1>
+      <a:accent2>
+        <a:srgbClr val="ED7D31"/>
+      </a:accent2>
+      <a:accent3>
+        <a:srgbClr val="A5A5A5"/>
+      </a:accent3>
+      <a:accent4>
+        <a:srgbClr val="FFC000"/>
+      </a:accent4>
+      <a:accent5>
+        <a:srgbClr val="5B9BD5"/>
+      </a:accent5>
+      <a:accent6>
+        <a:srgbClr val="70AD47"/>
+      </a:accent6>
+      <a:hlink>
+        <a:srgbClr val="0563C1"/>
+      </a:hlink>
+      <a:folHlink>
+        <a:srgbClr val="954F72"/>
+      </a:folHlink>
+    </a:clrScheme>
+    <a:fontScheme name="Office">
+      <a:majorFont>
+        <a:latin typeface="Calibri Light" panose="020F0302020204030204"/>
+        <a:ea typeface=""/>
+        <a:cs typeface=""/>
+        <a:font script="Jpan" typeface="游ゴシック Light"/>
+        <a:font script="Hang" typeface="맑은 고딕"/>
+        <a:font script="Hans" typeface="等线 Light"/>
+        <a:font script="Hant" typeface="新細明體"/>
+        <a:font script="Arab" typeface="Times New Roman"/>
+        <a:font script="Hebr" typeface="Times New Roman"/>
+        <a:font script="Thai" typeface="Angsana New"/>
+        <a:font script="Ethi" typeface="Nyala"/>
+        <a:font script="Beng" typeface="Vrinda"/>
+        <a:font script="Gujr" typeface="Shruti"/>
+        <a:font script="Khmr" typeface="MoolBoran"/>
+        <a:font script="Knda" typeface="Tunga"/>
+        <a:font script="Guru" typeface="Raavi"/>
+        <a:font script="Cans" typeface="Euphemia"/>
+        <a:font script="Cher" typeface="Plantagenet Cherokee"/>
+        <a:font script="Yiii" typeface="Microsoft Yi Baiti"/>
+        <a:font script="Tibt" typeface="Microsoft Himalaya"/>
+        <a:font script="Thaa" typeface="MV Boli"/>
+        <a:font script="Deva" typeface="Mangal"/>
+        <a:font script="Telu" typeface="Gautami"/>
+        <a:font script="Taml" typeface="Latha"/>
+        <a:font script="Syrc" typeface="Estrangelo Edessa"/>
+        <a:font script="Orya" typeface="Kalinga"/>
+        <a:font script="Mlym" typeface="Kartika"/>
+        <a:font script="Laoo" typeface="DokChampa"/>
+        <a:font script="Sinh" typeface="Iskoola Pota"/>
+        <a:font script="Mong" typeface="Mongolian Baiti"/>
+        <a:font script="Viet" typeface="Times New Roman"/>
+        <a:font script="Uigh" typeface="Microsoft Uighur"/>
+        <a:font script="Geor" typeface="Sylfaen"/>
+        <a:font script="Armn" typeface="Arial"/>
+        <a:font script="Bugi" typeface="Leelawadee UI"/>
+        <a:font script="Bopo" typeface="Microsoft JhengHei"/>
+        <a:font script="Java" typeface="Javanese Text"/>
+        <a:font script="Lisu" typeface="Segoe UI"/>
+        <a:font script="Mymr" typeface="Myanmar Text"/>
+        <a:font script="Nkoo" typeface="Ebrima"/>
+        <a:font script="Olck" typeface="Nirmala UI"/>
+        <a:font script="Osma" typeface="Ebrima"/>
+        <a:font script="Phag" typeface="Phagspa"/>
+        <a:font script="Syrn" typeface="Estrangelo Edessa"/>
+        <a:font script="Syrj" typeface="Estrangelo Edessa"/>
+        <a:font script="Syre" typeface="Estrangelo Edessa"/>
+        <a:font script="Sora" typeface="Nirmala UI"/>
+        <a:font script="Tale" typeface="Microsoft Tai Le"/>
+        <a:font script="Talu" typeface="Microsoft New Tai Lue"/>
+        <a:font script="Tfng" typeface="Ebrima"/>
+      </a:majorFont>
+      <a:minorFont>
+        <a:latin typeface="Calibri" panose="020F0502020204030204"/>
+        <a:ea typeface=""/>
+        <a:cs typeface=""/>
+        <a:font script="Jpan" typeface="游ゴシック"/>
+        <a:font script="Hang" typeface="맑은 고딕"/>
+        <a:font script="Hans" typeface="等线"/>
+        <a:font script="Hant" typeface="新細明體"/>
+        <a:font script="Arab" typeface="Arial"/>
+        <a:font script="Hebr" typeface="Arial"/>
+        <a:font script="Thai" typeface="Cordia New"/>
+        <a:font script="Ethi" typeface="Nyala"/>
+        <a:font script="Beng" typeface="Vrinda"/>
+        <a:font script="Gujr" typeface="Shruti"/>
+        <a:font script="Khmr" typeface="DaunPenh"/>
+        <a:font script="Knda" typeface="Tunga"/>
+        <a:font script="Guru" typeface="Raavi"/>
+        <a:font script="Cans" typeface="Euphemia"/>
+        <a:font script="Cher" typeface="Plantagenet Cherokee"/>
+        <a:font script="Yiii" typeface="Microsoft Yi Baiti"/>
+        <a:font script="Tibt" typeface="Microsoft Himalaya"/>
+        <a:font script="Thaa" typeface="MV Boli"/>
+        <a:font script="Deva" typeface="Mangal"/>
+        <a:font script="Telu" typeface="Gautami"/>
+        <a:font script="Taml" typeface="Latha"/>
+        <a:font script="Syrc" typeface="Estrangelo Edessa"/>
+        <a:font script="Orya" typeface="Kalinga"/>
+        <a:font script="Mlym" typeface="Kartika"/>
+        <a:font script="Laoo" typeface="DokChampa"/>
+        <a:font script="Sinh" typeface="Iskoola Pota"/>
+        <a:font script="Mong" typeface="Mongolian Baiti"/>
+        <a:font script="Viet" typeface="Arial"/>
+        <a:font script="Uigh" typeface="Microsoft Uighur"/>
+        <a:font script="Geor" typeface="Sylfaen"/>
+        <a:font script="Armn" typeface="Arial"/>
+        <a:font script="Bugi" typeface="Leelawadee UI"/>
+        <a:font script="Bopo" typeface="Microsoft JhengHei"/>
+        <a:font script="Java" typeface="Javanese Text"/>
+        <a:font script="Lisu" typeface="Segoe UI"/>
+        <a:font script="Mymr" typeface="Myanmar Text"/>
+        <a:font script="Nkoo" typeface="Ebrima"/>
+        <a:font script="Olck" typeface="Nirmala UI"/>
+        <a:font script="Osma" typeface="Ebrima"/>
+        <a:font script="Phag" typeface="Phagspa"/>
+        <a:font script="Syrn" typeface="Estrangelo Edessa"/>
+        <a:font script="Syrj" typeface="Estrangelo Edessa"/>
+        <a:font script="Syre" typeface="Estrangelo Edessa"/>
+        <a:font script="Sora" typeface="Nirmala UI"/>
+        <a:font script="Tale" typeface="Microsoft Tai Le"/>
+        <a:font script="Talu" typeface="Microsoft New Tai Lue"/>
+        <a:font script="Tfng" typeface="Ebrima"/>
+      </a:minorFont>
+    </a:fontScheme>
+    <a:fmtScheme name="Office">
+      <a:fillStyleLst>
+        <a:solidFill>
+          <a:schemeClr val="phClr"/>
+        </a:solidFill>
+        <a:gradFill rotWithShape="1">
+          <a:gsLst>
+            <a:gs pos="0">
+              <a:schemeClr val="phClr">
+                <a:lumMod val="110000"/>
+                <a:satMod val="105000"/>
+                <a:tint val="67000"/>
+              </a:schemeClr>
+            </a:gs>
+            <a:gs pos="50000">
+              <a:schemeClr val="phClr">
+                <a:lumMod val="105000"/>
+                <a:satMod val="103000"/>
+                <a:tint val="73000"/>
+              </a:schemeClr>
+            </a:gs>
+            <a:gs pos="100000">
+              <a:schemeClr val="phClr">
+                <a:lumMod val="105000"/>
+                <a:satMod val="109000"/>
+                <a:tint val="81000"/>
+              </a:schemeClr>
+            </a:gs>
+          </a:gsLst>
+          <a:lin ang="5400000" scaled="0"/>
+        </a:gradFill>
+        <a:gradFill rotWithShape="1">
+          <a:gsLst>
+            <a:gs pos="0">
+              <a:schemeClr val="phClr">
+                <a:satMod val="103000"/>
+                <a:lumMod val="102000"/>
+                <a:tint val="94000"/>
+              </a:schemeClr>
+            </a:gs>
+            <a:gs pos="50000">
+              <a:schemeClr val="phClr">
+                <a:satMod val="110000"/>
+                <a:lumMod val="100000"/>
+                <a:shade val="100000"/>
+              </a:schemeClr>
+            </a:gs>
+            <a:gs pos="100000">
+              <a:schemeClr val="phClr">
+                <a:lumMod val="99000"/>
+                <a:satMod val="120000"/>
+                <a:shade val="78000"/>
+              </a:schemeClr>
+            </a:gs>
+          </a:gsLst>
+          <a:lin ang="5400000" scaled="0"/>
+        </a:gradFill>
+      </a:fillStyleLst>
+      <a:lnStyleLst>
+        <a:ln w="6350" cap="flat" cmpd="sng" algn="ctr">
+          <a:solidFill>
+            <a:schemeClr val="phClr"/>
+          </a:solidFill>
+          <a:prstDash val="solid"/>
+          <a:miter lim="800000"/>
+        </a:ln>
+        <a:ln w="12700" cap="flat" cmpd="sng" algn="ctr">
+          <a:solidFill>
+            <a:schemeClr val="phClr"/>
+          </a:solidFill>
+          <a:prstDash val="solid"/>
+          <a:miter lim="800000"/>
+        </a:ln>
+        <a:ln w="19050" cap="flat" cmpd="sng" algn="ctr">
+          <a:solidFill>
+            <a:schemeClr val="phClr"/>
+          </a:solidFill>
+          <a:prstDash val="solid"/>
+          <a:miter lim="800000"/>
+        </a:ln>
+      </a:lnStyleLst>
+      <a:effectStyleLst>
+        <a:effectStyle>
+          <a:effectLst/>
+        </a:effectStyle>
+        <a:effectStyle>
+          <a:effectLst/>
+        </a:effectStyle>
+        <a:effectStyle>
+          <a:effectLst>
+            <a:outerShdw blurRad="57150" dist="19050" dir="5400000" algn="ctr" rotWithShape="0">
+              <a:srgbClr val="000000">
+                <a:alpha val="63000"/>
+              </a:srgbClr>
+            </a:outerShdw>
+          </a:effectLst>
+        </a:effectStyle>
+      </a:effectStyleLst>
+      <a:bgFillStyleLst>
+        <a:solidFill>
+          <a:schemeClr val="phClr"/>
+        </a:solidFill>
+        <a:solidFill>
+          <a:schemeClr val="phClr">
+            <a:tint val="95000"/>
+            <a:satMod val="170000"/>
+          </a:schemeClr>
+        </a:solidFill>
+        <a:gradFill rotWithShape="1">
+          <a:gsLst>
+            <a:gs pos="0">
+              <a:schemeClr val="phClr">
+                <a:tint val="93000"/>
+                <a:satMod val="150000"/>
+                <a:shade val="98000"/>
+                <a:lumMod val="102000"/>
+              </a:schemeClr>
+            </a:gs>
+            <a:gs pos="50000">
+              <a:schemeClr val="phClr">
+                <a:tint val="98000"/>
+                <a:satMod val="130000"/>
+                <a:shade val="90000"/>
+                <a:lumMod val="103000"/>
+              </a:schemeClr>
+            </a:gs>
+            <a:gs pos="100000">
+              <a:schemeClr val="phClr">
+                <a:shade val="63000"/>
+                <a:satMod val="120000"/>
+              </a:schemeClr>
+            </a:gs>
+          </a:gsLst>
+          <a:lin ang="5400000" scaled="0"/>
+        </a:gradFill>
+      </a:bgFillStyleLst>
+    </a:fmtScheme>
+  </a:themeElements>
+  <a:objectDefaults/>
+  <a:extraClrSchemeLst/>
+  <a:extLst>
+    <a:ext uri="{05A4C25C-085E-4340-85A3-A5531E510DB2}">
+      <thm15:themeFamily xmlns:thm15="http://schemas.microsoft.com/office/thememl/2012/main" name="Office Theme" id="{62F939B6-93AF-4DB8-9C6B-D6C7DFDC589F}" vid="{4A3C46E8-61CC-4603-A589-7422A47A8E4A}"/>
+    </a:ext>
+  </a:extLst>
+</a:theme>
 </file>
</xml_diff>

<commit_message>
Space filling and formatting.
</commit_message>
<xml_diff>
--- a/mapping_project-poster.pptx
+++ b/mapping_project-poster.pptx
@@ -197,7 +197,7 @@
           <a:p>
             <a:fld id="{0E5820E2-07A4-7E46-B940-ED06D469D0A9}" type="datetimeFigureOut">
               <a:rPr lang="en-NL" smtClean="0"/>
-              <a:t>31/01/2021</a:t>
+              <a:t>01/31/2021</a:t>
             </a:fld>
             <a:endParaRPr lang="en-NL"/>
           </a:p>
@@ -356,7 +356,7 @@
           <a:p>
             <a:fld id="{01B03D1D-E699-7A42-AAF2-6CB121A05637}" type="slidenum">
               <a:rPr lang="en-NL" smtClean="0"/>
-              <a:t>‹#›</a:t>
+              <a:t>‹Nr.›</a:t>
             </a:fld>
             <a:endParaRPr lang="en-NL"/>
           </a:p>
@@ -1808,72 +1808,108 @@
           </a:p>
           <a:p>
             <a:r>
-              <a:rPr lang="en-US" dirty="0"/>
+              <a:rPr lang="en-US" dirty="0">
+                <a:latin typeface="Roboto Condensed Light"/>
+              </a:rPr>
               <a:t>Mapping Project</a:t>
             </a:r>
             <a:br>
-              <a:rPr lang="en-US" dirty="0"/>
+              <a:rPr lang="en-US" dirty="0">
+                <a:latin typeface="Roboto Condensed Light"/>
+              </a:rPr>
             </a:br>
             <a:r>
-              <a:rPr lang="en-US" dirty="0"/>
+              <a:rPr lang="en-US" dirty="0">
+                <a:latin typeface="Roboto Condensed Light"/>
+              </a:rPr>
               <a:t>Winter Semester 2020/2021</a:t>
             </a:r>
             <a:br>
-              <a:rPr lang="en-US" dirty="0"/>
+              <a:rPr lang="en-US" dirty="0">
+                <a:latin typeface="Roboto Condensed Light"/>
+              </a:rPr>
             </a:br>
             <a:r>
-              <a:rPr lang="en-US" dirty="0" err="1"/>
+              <a:rPr lang="en-US" dirty="0" err="1">
+                <a:latin typeface="Roboto Condensed Light"/>
+              </a:rPr>
               <a:t>Technische</a:t>
             </a:r>
             <a:r>
-              <a:rPr lang="en-US" dirty="0"/>
+              <a:rPr lang="en-US" dirty="0">
+                <a:latin typeface="Roboto Condensed Light"/>
+              </a:rPr>
               <a:t> </a:t>
             </a:r>
             <a:r>
-              <a:rPr lang="en-US" dirty="0" err="1"/>
+              <a:rPr lang="en-US" dirty="0" err="1">
+                <a:latin typeface="Roboto Condensed Light"/>
+              </a:rPr>
               <a:t>Universität</a:t>
             </a:r>
             <a:r>
-              <a:rPr lang="en-US" dirty="0"/>
+              <a:rPr lang="en-US" dirty="0">
+                <a:latin typeface="Roboto Condensed Light"/>
+              </a:rPr>
               <a:t> </a:t>
             </a:r>
             <a:r>
-              <a:rPr lang="en-US" dirty="0" err="1"/>
+              <a:rPr lang="en-US" dirty="0" err="1">
+                <a:latin typeface="Roboto Condensed Light"/>
+              </a:rPr>
               <a:t>München</a:t>
             </a:r>
-            <a:endParaRPr lang="en-US" dirty="0"/>
-          </a:p>
-          <a:p>
-            <a:r>
-              <a:rPr lang="de-DE" dirty="0" err="1"/>
+            <a:endParaRPr lang="en-US" dirty="0">
+              <a:latin typeface="Roboto Condensed Light"/>
+            </a:endParaRPr>
+          </a:p>
+          <a:p>
+            <a:r>
+              <a:rPr lang="de-DE" dirty="0" err="1">
+                <a:latin typeface="Roboto Condensed Light"/>
+              </a:rPr>
               <a:t>Esmé</a:t>
             </a:r>
             <a:r>
-              <a:rPr lang="de-DE" dirty="0"/>
+              <a:rPr lang="de-DE" dirty="0">
+                <a:latin typeface="Roboto Condensed Light"/>
+              </a:rPr>
               <a:t> </a:t>
             </a:r>
             <a:r>
-              <a:rPr lang="de-DE" dirty="0" err="1"/>
+              <a:rPr lang="de-DE" dirty="0" err="1">
+                <a:latin typeface="Roboto Condensed Light"/>
+              </a:rPr>
               <a:t>Middaugh</a:t>
             </a:r>
-            <a:endParaRPr lang="de-DE" dirty="0"/>
-          </a:p>
-          <a:p>
-            <a:r>
-              <a:rPr lang="de-DE" dirty="0"/>
+            <a:endParaRPr lang="de-DE" dirty="0">
+              <a:latin typeface="Roboto Condensed Light"/>
+            </a:endParaRPr>
+          </a:p>
+          <a:p>
+            <a:r>
+              <a:rPr lang="de-DE" dirty="0">
+                <a:latin typeface="Roboto Condensed Light"/>
+              </a:rPr>
               <a:t>Nele Peschel</a:t>
             </a:r>
           </a:p>
           <a:p>
             <a:r>
-              <a:rPr lang="de-DE" dirty="0"/>
+              <a:rPr lang="de-DE" dirty="0">
+                <a:latin typeface="Roboto Condensed Light"/>
+              </a:rPr>
               <a:t>Vivien van </a:t>
             </a:r>
             <a:r>
-              <a:rPr lang="de-DE" dirty="0" err="1"/>
+              <a:rPr lang="de-DE" dirty="0" err="1">
+                <a:latin typeface="Roboto Condensed Light"/>
+              </a:rPr>
               <a:t>Dongen</a:t>
             </a:r>
-            <a:endParaRPr lang="de-DE" dirty="0"/>
+            <a:endParaRPr lang="de-DE" dirty="0">
+              <a:latin typeface="Roboto Condensed Light"/>
+            </a:endParaRPr>
           </a:p>
           <a:p>
             <a:pPr>
@@ -1892,27 +1928,36 @@
           </a:p>
           <a:p>
             <a:r>
-              <a:rPr lang="en-US" dirty="0"/>
+              <a:rPr lang="en-US" dirty="0">
+                <a:latin typeface="Roboto Condensed Light"/>
+              </a:rPr>
               <a:t>Juliane Cron, M.Sc.</a:t>
             </a:r>
           </a:p>
           <a:p>
             <a:r>
-              <a:rPr lang="en-US" dirty="0"/>
+              <a:rPr lang="en-US" dirty="0">
+                <a:latin typeface="Roboto Condensed Light"/>
+              </a:rPr>
               <a:t>Dr.-</a:t>
             </a:r>
             <a:r>
-              <a:rPr lang="en-US" dirty="0" err="1"/>
+              <a:rPr lang="en-US" dirty="0" err="1">
+                <a:latin typeface="Roboto Condensed Light"/>
+              </a:rPr>
               <a:t>Ing</a:t>
             </a:r>
             <a:r>
-              <a:rPr lang="en-US" dirty="0"/>
+              <a:rPr lang="en-US" dirty="0">
+                <a:latin typeface="Roboto Condensed Light"/>
+              </a:rPr>
               <a:t>. Mathias Jahnke</a:t>
             </a:r>
             <a:endParaRPr lang="en-US" b="1" cap="all" spc="200" dirty="0">
               <a:solidFill>
                 <a:srgbClr val="17ACCE"/>
               </a:solidFill>
+              <a:latin typeface="Roboto Condensed Light"/>
             </a:endParaRPr>
           </a:p>
           <a:p>
@@ -1932,7 +1977,9 @@
           </a:p>
           <a:p>
             <a:r>
-              <a:rPr lang="en-US" dirty="0"/>
+              <a:rPr lang="en-US" dirty="0">
+                <a:latin typeface="Roboto Condensed Light"/>
+              </a:rPr>
               <a:t>Google Trends, COVID-19, pandemic, Web Searches, WHO</a:t>
             </a:r>
           </a:p>
@@ -1953,14 +2000,20 @@
           </a:p>
           <a:p>
             <a:r>
-              <a:rPr lang="en-US" dirty="0"/>
+              <a:rPr lang="en-US" dirty="0">
+                <a:latin typeface="Roboto Condensed Light"/>
+              </a:rPr>
               <a:t>https://searching-for-the-essentials.</a:t>
             </a:r>
             <a:br>
-              <a:rPr lang="en-US" dirty="0"/>
+              <a:rPr lang="en-US" dirty="0">
+                <a:latin typeface="Roboto Condensed Light"/>
+              </a:rPr>
             </a:br>
             <a:r>
-              <a:rPr lang="en-US" dirty="0"/>
+              <a:rPr lang="en-US" dirty="0">
+                <a:latin typeface="Roboto Condensed Light"/>
+              </a:rPr>
               <a:t>herokuapp.com</a:t>
             </a:r>
           </a:p>
@@ -2038,26 +2091,25 @@
           <a:lstStyle/>
           <a:p>
             <a:r>
-              <a:rPr lang="en-GB" sz="2400" b="1" dirty="0"/>
+              <a:rPr lang="en-GB" b="1" dirty="0"/>
               <a:t>When the COVID-19 pandemic hit the world, nearly every aspect of daily life was affected. The food industry, normally functioning smoothly and unobtrusively, was shaken as people began hoarding products like pasta or toilet paper</a:t>
             </a:r>
             <a:r>
-              <a:rPr lang="en-US" sz="2400" b="1" dirty="0"/>
+              <a:rPr lang="en-US" b="1" dirty="0"/>
               <a:t>. Our interactive web map application aims</a:t>
             </a:r>
             <a:r>
-              <a:rPr lang="en-GB" sz="2400" b="1" dirty="0"/>
+              <a:rPr lang="en-GB" b="1" dirty="0"/>
               <a:t> to visualize the impact of COVID-19 on interests in food and other essential items in three European countries based on </a:t>
             </a:r>
             <a:r>
-              <a:rPr lang="en-GB" sz="2400" b="1" i="1" dirty="0"/>
+              <a:rPr lang="en-GB" b="1" i="1" dirty="0"/>
               <a:t>Google Trends</a:t>
             </a:r>
             <a:r>
-              <a:rPr lang="en-GB" sz="2400" b="1" dirty="0"/>
+              <a:rPr lang="en-GB" b="1" dirty="0"/>
               <a:t> data [1] of specific products.</a:t>
             </a:r>
-            <a:endParaRPr lang="en-GB" dirty="0"/>
           </a:p>
           <a:p>
             <a:pPr>
@@ -2072,22 +2124,32 @@
           </a:p>
           <a:p>
             <a:r>
-              <a:rPr lang="en-US" baseline="0" dirty="0"/>
+              <a:rPr lang="en-US" baseline="0" dirty="0">
+                <a:latin typeface="Roboto Condensed Light"/>
+              </a:rPr>
               <a:t>Our web application is divided into two sections: the </a:t>
             </a:r>
             <a:r>
-              <a:rPr lang="en-US" dirty="0"/>
+              <a:rPr lang="en-US" dirty="0">
+                <a:latin typeface="Roboto Condensed Light"/>
+              </a:rPr>
               <a:t>FOOD and the COUNTRY section. The former shows a </a:t>
             </a:r>
             <a:r>
-              <a:rPr lang="en-US" baseline="0" dirty="0"/>
+              <a:rPr lang="en-US" baseline="0" dirty="0">
+                <a:latin typeface="Roboto Condensed Light"/>
+              </a:rPr>
               <a:t>divergent proportional symbol map comparing the evolution of one search term among </a:t>
             </a:r>
             <a:r>
-              <a:rPr lang="en-US" dirty="0"/>
-              <a:t>Germany, the Netherlands and the United Kingdom; the latter contains a radar chart allowing the visitor to discover differences between all 15 search terms across the countries.</a:t>
-            </a:r>
-            <a:endParaRPr lang="en-US" baseline="0" dirty="0"/>
+              <a:rPr lang="en-US" dirty="0">
+                <a:latin typeface="Roboto Condensed Light"/>
+              </a:rPr>
+              <a:t>Germany, the Netherlands and the United Kingdom; the latter contains a radar chart allowing the visitor to discover differences between all 15 search terms across the countries. In addition, both sections show the evolution of the COVID-19 cases.</a:t>
+            </a:r>
+            <a:endParaRPr lang="en-US" baseline="0" dirty="0">
+              <a:latin typeface="Roboto Condensed Light"/>
+            </a:endParaRPr>
           </a:p>
           <a:p>
             <a:pPr>
@@ -2102,43 +2164,63 @@
           </a:p>
           <a:p>
             <a:r>
-              <a:rPr lang="en-US" dirty="0"/>
+              <a:rPr lang="en-US" dirty="0">
+                <a:latin typeface="Roboto Condensed Light"/>
+              </a:rPr>
               <a:t>When opening the web application or by clicking on the navigation button FOOD, the user gets to select a search term by clicking on the respective icon (Fig. 1). The map</a:t>
             </a:r>
             <a:r>
-              <a:rPr lang="en-US" baseline="0" dirty="0"/>
+              <a:rPr lang="en-US" baseline="0" dirty="0">
+                <a:latin typeface="Roboto Condensed Light"/>
+              </a:rPr>
               <a:t> visualizes the Search Trend Popularity for the selected term during 2020 compared to the previous year without COVID-19 impact (Fig. 2). The </a:t>
             </a:r>
             <a:r>
-              <a:rPr lang="en-US" dirty="0"/>
+              <a:rPr lang="en-US" dirty="0">
+                <a:latin typeface="Roboto Condensed Light"/>
+              </a:rPr>
               <a:t>blue circles indicate </a:t>
             </a:r>
             <a:r>
-              <a:rPr lang="en-US" baseline="0" dirty="0"/>
+              <a:rPr lang="en-US" baseline="0" dirty="0">
+                <a:latin typeface="Roboto Condensed Light"/>
+              </a:rPr>
               <a:t>a higher search frequency during the pandemic while the red circles show a lower search query. We chose a</a:t>
             </a:r>
             <a:r>
-              <a:rPr lang="en-US" dirty="0"/>
+              <a:rPr lang="en-US" dirty="0">
+                <a:latin typeface="Roboto Condensed Light"/>
+              </a:rPr>
               <a:t> </a:t>
             </a:r>
             <a:r>
-              <a:rPr lang="en-US" baseline="0" dirty="0"/>
+              <a:rPr lang="en-US" baseline="0" dirty="0">
+                <a:latin typeface="Roboto Condensed Light"/>
+              </a:rPr>
               <a:t>conic conformal map projection </a:t>
             </a:r>
             <a:r>
-              <a:rPr lang="en-US" dirty="0"/>
+              <a:rPr lang="en-US" dirty="0">
+                <a:latin typeface="Roboto Condensed Light"/>
+              </a:rPr>
               <a:t>as it is</a:t>
             </a:r>
             <a:r>
-              <a:rPr lang="en-US" baseline="0" dirty="0"/>
+              <a:rPr lang="en-US" baseline="0" dirty="0">
+                <a:latin typeface="Roboto Condensed Light"/>
+              </a:rPr>
               <a:t> </a:t>
             </a:r>
             <a:r>
-              <a:rPr lang="en-US" dirty="0"/>
+              <a:rPr lang="en-US" dirty="0">
+                <a:latin typeface="Roboto Condensed Light"/>
+              </a:rPr>
               <a:t>suitable for </a:t>
             </a:r>
             <a:r>
-              <a:rPr lang="en-US" baseline="0" dirty="0"/>
+              <a:rPr lang="en-US" baseline="0" dirty="0">
+                <a:latin typeface="Roboto Condensed Light"/>
+              </a:rPr>
               <a:t>our area of interest extending from east to west.</a:t>
             </a:r>
           </a:p>
@@ -2162,8 +2244,8 @@
         </p:nvSpPr>
         <p:spPr>
           <a:xfrm>
-            <a:off x="5993812" y="18890672"/>
-            <a:ext cx="4481250" cy="8494433"/>
+            <a:off x="5992497" y="18890672"/>
+            <a:ext cx="4481250" cy="8249227"/>
           </a:xfrm>
         </p:spPr>
         <p:txBody>
@@ -2185,36 +2267,28 @@
           <a:p>
             <a:pPr fontAlgn="base"/>
             <a:r>
-              <a:rPr lang="en-US" dirty="0"/>
+              <a:rPr lang="en-US" dirty="0">
+                <a:latin typeface="Roboto Condensed Light"/>
+              </a:rPr>
               <a:t>Clicking on the navigation button COUNTRY a radar chart pops up comparing the 15 search terms across the countries selected in the dropdown menu (Fig. 3). A timeline animation can be started, or the time can be selected individually. N</a:t>
             </a:r>
             <a:r>
-              <a:rPr lang="en-GB" dirty="0" err="1"/>
+              <a:rPr lang="en-GB" dirty="0" err="1">
+                <a:latin typeface="Roboto Condensed Light"/>
+              </a:rPr>
               <a:t>egative</a:t>
             </a:r>
             <a:r>
-              <a:rPr lang="en-GB" dirty="0"/>
+              <a:rPr lang="en-GB" dirty="0">
+                <a:latin typeface="Roboto Condensed Light"/>
+              </a:rPr>
               <a:t> and positive values indicate lower or higher searches compared to the year before. Additional support is given by line plots presenting the evolution of each search term</a:t>
             </a:r>
             <a:r>
-              <a:rPr lang="de-DE" dirty="0"/>
-              <a:t> and </a:t>
-            </a:r>
-            <a:r>
-              <a:rPr lang="de-DE" dirty="0" err="1"/>
-              <a:t>the</a:t>
-            </a:r>
-            <a:r>
-              <a:rPr lang="de-DE" dirty="0"/>
-              <a:t> COVID-19 </a:t>
-            </a:r>
-            <a:r>
-              <a:rPr lang="de-DE" dirty="0" err="1"/>
-              <a:t>infection</a:t>
-            </a:r>
-            <a:r>
-              <a:rPr lang="de-DE" dirty="0"/>
-              <a:t> rate.</a:t>
+              <a:rPr lang="de-DE" dirty="0">
+                <a:latin typeface="Roboto Condensed Light"/>
+              </a:rPr>
+              <a:t>.</a:t>
             </a:r>
             <a:endParaRPr lang="en-US" sz="2400" b="1" cap="all" spc="200" dirty="0"/>
           </a:p>
@@ -2232,22 +2306,44 @@
           </a:p>
           <a:p>
             <a:r>
-              <a:rPr lang="en-GB" dirty="0"/>
-              <a:t>We used the Google Trends data from 1/2019 to 11/2020 and calculated the differences between the first and the second year </a:t>
-            </a:r>
-            <a:r>
-              <a:rPr lang="en-US" dirty="0"/>
-              <a:t>[1].</a:t>
-            </a:r>
-            <a:r>
-              <a:rPr lang="en-US" baseline="0" dirty="0"/>
-              <a:t> </a:t>
-            </a:r>
-            <a:r>
-              <a:rPr lang="en-US" dirty="0"/>
-              <a:t>For the daily COVID-19 cases we used the data from the WHO [2]. The WHO data starts on 1/2020.</a:t>
-            </a:r>
-            <a:endParaRPr lang="de-AT" dirty="0"/>
+              <a:rPr lang="en-GB" dirty="0">
+                <a:latin typeface="Roboto Condensed Light"/>
+              </a:rPr>
+              <a:t>We used the </a:t>
+            </a:r>
+            <a:r>
+              <a:rPr lang="en-GB" i="1" dirty="0">
+                <a:latin typeface="Roboto Condensed Light"/>
+              </a:rPr>
+              <a:t>Google Trends </a:t>
+            </a:r>
+            <a:r>
+              <a:rPr lang="en-GB" dirty="0">
+                <a:latin typeface="Roboto Condensed Light"/>
+              </a:rPr>
+              <a:t>data from 1/2019 to 11/2020 and calculated the differences between the two years </a:t>
+            </a:r>
+            <a:r>
+              <a:rPr lang="en-US" dirty="0">
+                <a:latin typeface="Roboto Condensed Light"/>
+              </a:rPr>
+              <a:t>[1]. For the daily COVID-19 cases we collected the data from the </a:t>
+            </a:r>
+            <a:r>
+              <a:rPr lang="en-US" i="1" dirty="0">
+                <a:latin typeface="Roboto Condensed Light"/>
+              </a:rPr>
+              <a:t>WHO</a:t>
+            </a:r>
+            <a:r>
+              <a:rPr lang="en-US" dirty="0">
+                <a:latin typeface="Roboto Condensed Light"/>
+              </a:rPr>
+              <a:t> [2] starting on 1/2020.</a:t>
+            </a:r>
+            <a:endParaRPr lang="de-AT" dirty="0">
+              <a:latin typeface="Roboto Condensed Light"/>
+            </a:endParaRPr>
           </a:p>
         </p:txBody>
       </p:sp>
@@ -2267,8 +2363,8 @@
         </p:nvSpPr>
         <p:spPr>
           <a:xfrm>
-            <a:off x="10907999" y="18890672"/>
-            <a:ext cx="4482000" cy="8494435"/>
+            <a:off x="10907999" y="18890673"/>
+            <a:ext cx="4482000" cy="8249227"/>
           </a:xfrm>
           <a:prstGeom prst="rect">
             <a:avLst/>
@@ -2448,7 +2544,7 @@
           <a:p>
             <a:pPr>
               <a:spcBef>
-                <a:spcPts val="2268"/>
+                <a:spcPts val="2300"/>
               </a:spcBef>
             </a:pPr>
             <a:r>
@@ -2458,42 +2554,62 @@
           </a:p>
           <a:p>
             <a:r>
-              <a:rPr lang="en-US" sz="2400" dirty="0"/>
+              <a:rPr lang="en-US" sz="2400" dirty="0">
+                <a:latin typeface="Roboto Condensed Light"/>
+              </a:rPr>
               <a:t>The interactive </a:t>
             </a:r>
             <a:r>
-              <a:rPr lang="de-DE" sz="2400" dirty="0"/>
+              <a:rPr lang="de-DE" sz="2400" dirty="0">
+                <a:latin typeface="Roboto Condensed Light"/>
+              </a:rPr>
               <a:t>web </a:t>
             </a:r>
             <a:r>
-              <a:rPr lang="de-DE" sz="2400" dirty="0" err="1"/>
+              <a:rPr lang="de-DE" sz="2400" dirty="0" err="1">
+                <a:latin typeface="Roboto Condensed Light"/>
+              </a:rPr>
               <a:t>application</a:t>
             </a:r>
             <a:r>
-              <a:rPr lang="de-DE" sz="2400" dirty="0"/>
+              <a:rPr lang="de-DE" sz="2400" dirty="0">
+                <a:latin typeface="Roboto Condensed Light"/>
+              </a:rPr>
               <a:t> was </a:t>
             </a:r>
             <a:r>
-              <a:rPr lang="de-DE" sz="2400" dirty="0" err="1"/>
+              <a:rPr lang="de-DE" sz="2400" dirty="0" err="1">
+                <a:latin typeface="Roboto Condensed Light"/>
+              </a:rPr>
               <a:t>designed</a:t>
             </a:r>
             <a:r>
-              <a:rPr lang="de-DE" sz="2400" dirty="0"/>
+              <a:rPr lang="de-DE" sz="2400" dirty="0">
+                <a:latin typeface="Roboto Condensed Light"/>
+              </a:rPr>
               <a:t> </a:t>
             </a:r>
             <a:r>
-              <a:rPr lang="en-GB" sz="2400" dirty="0"/>
+              <a:rPr lang="en-GB" sz="2400" dirty="0">
+                <a:latin typeface="Roboto Condensed Light"/>
+              </a:rPr>
               <a:t>with </a:t>
             </a:r>
             <a:r>
-              <a:rPr lang="en-GB" sz="2400" dirty="0" err="1"/>
+              <a:rPr lang="en-GB" sz="2400" dirty="0" err="1">
+                <a:latin typeface="Roboto Condensed Light"/>
+              </a:rPr>
               <a:t>Plotly</a:t>
             </a:r>
             <a:r>
-              <a:rPr lang="en-GB" sz="2400" dirty="0"/>
+              <a:rPr lang="en-GB" sz="2400" dirty="0">
+                <a:latin typeface="Roboto Condensed Light"/>
+              </a:rPr>
               <a:t>, a scientific graphing Python library. Dash, an open-source Python framework was used for building and deploying the application.</a:t>
             </a:r>
-            <a:endParaRPr lang="en-US" sz="2400" dirty="0"/>
+            <a:endParaRPr lang="en-US" sz="2400" dirty="0">
+              <a:latin typeface="Roboto Condensed Light"/>
+            </a:endParaRPr>
           </a:p>
           <a:p>
             <a:pPr>
@@ -2508,8 +2624,10 @@
           </a:p>
           <a:p>
             <a:r>
-              <a:rPr lang="en-US" sz="2400" dirty="0"/>
-              <a:t>The search term popularities noticeably changed during the COVID-19 break-out in 2020. Web searches for banana bread and toilet paper largely increased, while restaurants were searched less often. During the first wave people especially started looking for hand sanitizer and toilet paper, while the search for face masks was staggered for the countries due to regulations starting to apply at different times. All these trends can be further explored with our interactive web map application.</a:t>
+              <a:rPr lang="en-US" sz="2400" dirty="0">
+                <a:latin typeface="Roboto Condensed Light"/>
+              </a:rPr>
+              <a:t>The search term popularities changed during the COVID-19 break-out in 2020. Web searches for banana bread and toilet paper increased, while restaurants were searched less often. During the first wave people especially started looking for hand sanitizer and toilet paper, while the search for face masks was staggered for the countries due to regulations starting to apply at different times. All these trends can be further explored with our web map application.</a:t>
             </a:r>
           </a:p>
         </p:txBody>
@@ -2531,7 +2649,7 @@
         <p:spPr>
           <a:xfrm>
             <a:off x="15822000" y="17526954"/>
-            <a:ext cx="4482000" cy="9612946"/>
+            <a:ext cx="4482000" cy="9612945"/>
           </a:xfrm>
           <a:prstGeom prst="rect">
             <a:avLst/>
@@ -2725,39 +2843,53 @@
           <a:p>
             <a:pPr marL="355600" indent="-355600"/>
             <a:r>
-              <a:rPr lang="en-US" sz="2200" dirty="0"/>
+              <a:rPr lang="en-US" sz="2200" dirty="0">
+                <a:latin typeface="Roboto Condensed Light"/>
+              </a:rPr>
               <a:t>[1]	</a:t>
             </a:r>
             <a:r>
-              <a:rPr lang="en-GB" sz="2200" dirty="0"/>
+              <a:rPr lang="en-GB" sz="2200" dirty="0">
+                <a:latin typeface="Roboto Condensed Light"/>
+              </a:rPr>
               <a:t>Google Trends (2020). Google Trends. Retrieved Nov 11, 2020, </a:t>
             </a:r>
             <a:r>
               <a:rPr lang="en-GB" sz="2200" u="sng" dirty="0">
+                <a:latin typeface="Roboto Condensed Light"/>
                 <a:hlinkClick r:id="rId3"/>
               </a:rPr>
               <a:t>https://trends.google.com/trends/?geo=US</a:t>
             </a:r>
-            <a:endParaRPr lang="en-US" sz="2200" dirty="0"/>
+            <a:endParaRPr lang="en-US" sz="2200" dirty="0">
+              <a:latin typeface="Roboto Condensed Light"/>
+            </a:endParaRPr>
           </a:p>
           <a:p>
             <a:pPr marL="355600" indent="-355600"/>
             <a:r>
-              <a:rPr lang="en-US" sz="2200" dirty="0"/>
+              <a:rPr lang="en-US" sz="2200" dirty="0">
+                <a:latin typeface="Roboto Condensed Light"/>
+              </a:rPr>
               <a:t>[2]	</a:t>
             </a:r>
             <a:r>
-              <a:rPr lang="en-GB" sz="2200" dirty="0"/>
+              <a:rPr lang="en-GB" sz="2200" dirty="0">
+                <a:latin typeface="Roboto Condensed Light"/>
+              </a:rPr>
               <a:t> World Health Organization (2020). WHO Coronavirus Disease (COVID-19) Dashboard. Retrieved Nov 11, 2020, from </a:t>
             </a:r>
             <a:r>
               <a:rPr lang="en-GB" sz="2200" u="sng" dirty="0">
+                <a:latin typeface="Roboto Condensed Light"/>
                 <a:hlinkClick r:id="rId4"/>
               </a:rPr>
               <a:t>https://covid19.who.int/</a:t>
             </a:r>
             <a:r>
-              <a:rPr lang="en-GB" sz="2200" dirty="0"/>
+              <a:rPr lang="en-GB" sz="2200" dirty="0">
+                <a:latin typeface="Roboto Condensed Light"/>
+              </a:rPr>
               <a:t> </a:t>
             </a:r>
           </a:p>
@@ -2777,8 +2909,8 @@
         </p:nvSpPr>
         <p:spPr>
           <a:xfrm>
-            <a:off x="5828830" y="12360110"/>
-            <a:ext cx="9561170" cy="553998"/>
+            <a:off x="5993251" y="12388160"/>
+            <a:ext cx="9396000" cy="553998"/>
           </a:xfrm>
           <a:prstGeom prst="rect">
             <a:avLst/>
@@ -2818,8 +2950,8 @@
         </p:nvSpPr>
         <p:spPr>
           <a:xfrm>
-            <a:off x="5911415" y="18282316"/>
-            <a:ext cx="9396000" cy="276999"/>
+            <a:off x="5993251" y="18338372"/>
+            <a:ext cx="9311666" cy="276999"/>
           </a:xfrm>
           <a:prstGeom prst="rect">
             <a:avLst/>
@@ -2872,7 +3004,7 @@
         </p:blipFill>
         <p:spPr>
           <a:xfrm>
-            <a:off x="5911415" y="13052661"/>
+            <a:off x="5911415" y="13108761"/>
             <a:ext cx="9396000" cy="5063008"/>
           </a:xfrm>
           <a:prstGeom prst="rect">
@@ -2936,38 +3068,8 @@
         </p:blipFill>
         <p:spPr>
           <a:xfrm>
-            <a:off x="5828831" y="7019998"/>
+            <a:off x="5908917" y="7019998"/>
             <a:ext cx="9396000" cy="5201559"/>
-          </a:xfrm>
-          <a:prstGeom prst="rect">
-            <a:avLst/>
-          </a:prstGeom>
-        </p:spPr>
-      </p:pic>
-      <p:pic>
-        <p:nvPicPr>
-          <p:cNvPr id="26" name="Picture 25">
-            <a:extLst>
-              <a:ext uri="{FF2B5EF4-FFF2-40B4-BE49-F238E27FC236}">
-                <a16:creationId xmlns:a16="http://schemas.microsoft.com/office/drawing/2014/main" id="{411BD126-EC14-9E43-B6A1-498F4FFEAED9}"/>
-              </a:ext>
-            </a:extLst>
-          </p:cNvPr>
-          <p:cNvPicPr>
-            <a:picLocks noChangeAspect="1"/>
-          </p:cNvPicPr>
-          <p:nvPr/>
-        </p:nvPicPr>
-        <p:blipFill>
-          <a:blip r:embed="rId8"/>
-          <a:stretch>
-            <a:fillRect/>
-          </a:stretch>
-        </p:blipFill>
-        <p:spPr>
-          <a:xfrm>
-            <a:off x="1079434" y="24368103"/>
-            <a:ext cx="4482001" cy="2246688"/>
           </a:xfrm>
           <a:prstGeom prst="rect">
             <a:avLst/>
@@ -2988,8 +3090,8 @@
         </p:nvSpPr>
         <p:spPr>
           <a:xfrm>
-            <a:off x="1079621" y="26761549"/>
-            <a:ext cx="4481625" cy="553998"/>
+            <a:off x="1079245" y="26704853"/>
+            <a:ext cx="4479000" cy="553998"/>
           </a:xfrm>
           <a:prstGeom prst="rect">
             <a:avLst/>
@@ -3006,7 +3108,7 @@
                 <a:latin typeface="Roboto Condensed Light" pitchFamily="2" charset="0"/>
                 <a:ea typeface="Roboto Condensed Light" pitchFamily="2" charset="0"/>
               </a:rPr>
-              <a:t>Fig. 1 Search trends visualized by icon buttons</a:t>
+              <a:t>Fig. 1 Search terms visualized by icon buttons</a:t>
             </a:r>
             <a:endParaRPr lang="de-AT" i="1" dirty="0">
               <a:latin typeface="Roboto Condensed Light" pitchFamily="2" charset="0"/>
@@ -3015,6 +3117,93 @@
           </a:p>
         </p:txBody>
       </p:sp>
+      <p:grpSp>
+        <p:nvGrpSpPr>
+          <p:cNvPr id="5" name="Gruppieren 4">
+            <a:extLst>
+              <a:ext uri="{FF2B5EF4-FFF2-40B4-BE49-F238E27FC236}">
+                <a16:creationId xmlns:a16="http://schemas.microsoft.com/office/drawing/2014/main" id="{E74C1485-E5DC-4BD6-892D-CEA830B59B8F}"/>
+              </a:ext>
+            </a:extLst>
+          </p:cNvPr>
+          <p:cNvGrpSpPr/>
+          <p:nvPr/>
+        </p:nvGrpSpPr>
+        <p:grpSpPr>
+          <a:xfrm>
+            <a:off x="1077744" y="24113605"/>
+            <a:ext cx="4482001" cy="2474916"/>
+            <a:chOff x="1078869" y="23998181"/>
+            <a:chExt cx="4482001" cy="2474916"/>
+          </a:xfrm>
+        </p:grpSpPr>
+        <p:pic>
+          <p:nvPicPr>
+            <p:cNvPr id="26" name="Picture 25">
+              <a:extLst>
+                <a:ext uri="{FF2B5EF4-FFF2-40B4-BE49-F238E27FC236}">
+                  <a16:creationId xmlns:a16="http://schemas.microsoft.com/office/drawing/2014/main" id="{411BD126-EC14-9E43-B6A1-498F4FFEAED9}"/>
+                </a:ext>
+              </a:extLst>
+            </p:cNvPr>
+            <p:cNvPicPr>
+              <a:picLocks noChangeAspect="1"/>
+            </p:cNvPicPr>
+            <p:nvPr/>
+          </p:nvPicPr>
+          <p:blipFill>
+            <a:blip r:embed="rId8"/>
+            <a:stretch>
+              <a:fillRect/>
+            </a:stretch>
+          </p:blipFill>
+          <p:spPr>
+            <a:xfrm>
+              <a:off x="1078869" y="24226409"/>
+              <a:ext cx="4482001" cy="2246688"/>
+            </a:xfrm>
+            <a:prstGeom prst="rect">
+              <a:avLst/>
+            </a:prstGeom>
+          </p:spPr>
+        </p:pic>
+        <p:pic>
+          <p:nvPicPr>
+            <p:cNvPr id="3" name="Grafik 2" descr="Ein Bild, das Text, Geschirr, ClipArt, Tasse enthält.&#10;&#10;Automatisch generierte Beschreibung">
+              <a:extLst>
+                <a:ext uri="{FF2B5EF4-FFF2-40B4-BE49-F238E27FC236}">
+                  <a16:creationId xmlns:a16="http://schemas.microsoft.com/office/drawing/2014/main" id="{33D10067-7CCA-4406-9D82-FD07B5B74D7E}"/>
+                </a:ext>
+              </a:extLst>
+            </p:cNvPr>
+            <p:cNvPicPr>
+              <a:picLocks noChangeAspect="1"/>
+            </p:cNvPicPr>
+            <p:nvPr/>
+          </p:nvPicPr>
+          <p:blipFill>
+            <a:blip r:embed="rId9">
+              <a:extLst>
+                <a:ext uri="{28A0092B-C50C-407E-A947-70E740481C1C}">
+                  <a14:useLocalDpi xmlns:a14="http://schemas.microsoft.com/office/drawing/2010/main" val="0"/>
+                </a:ext>
+              </a:extLst>
+            </a:blip>
+            <a:stretch>
+              <a:fillRect/>
+            </a:stretch>
+          </p:blipFill>
+          <p:spPr>
+            <a:xfrm>
+              <a:off x="1078869" y="23998181"/>
+              <a:ext cx="1516413" cy="230845"/>
+            </a:xfrm>
+            <a:prstGeom prst="rect">
+              <a:avLst/>
+            </a:prstGeom>
+          </p:spPr>
+        </p:pic>
+      </p:grpSp>
     </p:spTree>
     <p:extLst>
       <p:ext uri="{BB962C8B-B14F-4D97-AF65-F5344CB8AC3E}">

</xml_diff>

<commit_message>
Focus & Symbol Map Sections
</commit_message>
<xml_diff>
--- a/mapping_project-poster.pptx
+++ b/mapping_project-poster.pptx
@@ -197,7 +197,7 @@
           <a:p>
             <a:fld id="{0E5820E2-07A4-7E46-B940-ED06D469D0A9}" type="datetimeFigureOut">
               <a:rPr lang="en-NL" smtClean="0"/>
-              <a:t>31/01/2021</a:t>
+              <a:t>1/31/21</a:t>
             </a:fld>
             <a:endParaRPr lang="en-NL"/>
           </a:p>
@@ -2047,7 +2047,7 @@
             </a:r>
             <a:r>
               <a:rPr lang="en-GB" sz="2400" b="1" dirty="0"/>
-              <a:t> to visualize the impact of COVID-19 on interests in food and other essential items in three European countries based on </a:t>
+              <a:t> to visualize the impact of COVID-19 on interests in food and other essential items in three European countries—Germany, the Netherlands, and the United Kingdom—based on </a:t>
             </a:r>
             <a:r>
               <a:rPr lang="en-GB" sz="2400" b="1" i="1" dirty="0"/>
@@ -2085,7 +2085,7 @@
             </a:r>
             <a:r>
               <a:rPr lang="en-US" dirty="0"/>
-              <a:t>Germany, the Netherlands and the United Kingdom; the latter contains a radar chart allowing the visitor to discover differences between all 15 search terms across the countries.</a:t>
+              <a:t>Germany, the Netherlands and the United Kingdom, along with a line chart of World Health Organization (WHO) data on COVID-19 infection rates with an orienting vertical line. The latter contains a radar chart allowing the visitor to discover differences between all 15 search terms across the countries, as well as a small multiple time series graph displaying the changes over the study time period.</a:t>
             </a:r>
             <a:endParaRPr lang="en-US" baseline="0" dirty="0"/>
           </a:p>
@@ -2103,19 +2103,19 @@
           <a:p>
             <a:r>
               <a:rPr lang="en-US" dirty="0"/>
-              <a:t>When opening the web application or by clicking on the navigation button FOOD, the user gets to select a search term by clicking on the respective icon (Fig. 1). The map</a:t>
+              <a:t>When opening the web application homepage (or by clicking on the navigation button FOOD), the user selects a search term by clicking on the respective icon (Fig. 1). The map</a:t>
             </a:r>
             <a:r>
               <a:rPr lang="en-US" baseline="0" dirty="0"/>
-              <a:t> visualizes the Search Trend Popularity for the selected term during 2020 compared to the previous year without COVID-19 impact (Fig. 2). The </a:t>
+              <a:t> visualizes the Search Trend Popularity for the selected term during 2020 compared to the previous year without COVID-19 impact (Fig. 2). Blue </a:t>
             </a:r>
             <a:r>
               <a:rPr lang="en-US" dirty="0"/>
-              <a:t>blue circles indicate </a:t>
+              <a:t>circles indicate </a:t>
             </a:r>
             <a:r>
               <a:rPr lang="en-US" baseline="0" dirty="0"/>
-              <a:t>a higher search frequency during the pandemic while the red circles show a lower search query. We chose a</a:t>
+              <a:t>a higher search frequency during the pandemic while red circles show a lower search query. We chose a</a:t>
             </a:r>
             <a:r>
               <a:rPr lang="en-US" dirty="0"/>
@@ -2276,7 +2276,7 @@
         </p:spPr>
         <p:txBody>
           <a:bodyPr vert="horz" lIns="0" tIns="0" rIns="0" bIns="0" rtlCol="0">
-            <a:normAutofit fontScale="92500"/>
+            <a:normAutofit/>
           </a:bodyPr>
           <a:lstStyle>
             <a:lvl1pPr marL="0" indent="0" algn="just" defTabSz="2138324" rtl="0" eaLnBrk="1" latinLnBrk="0" hangingPunct="1">

</xml_diff>

<commit_message>
Add Period to Figure 1, Radar Chart Section, References to Black
</commit_message>
<xml_diff>
--- a/mapping_project-poster.pptx
+++ b/mapping_project-poster.pptx
@@ -2085,7 +2085,7 @@
             </a:r>
             <a:r>
               <a:rPr lang="en-US" dirty="0"/>
-              <a:t>Germany, the Netherlands and the United Kingdom, along with a line chart of World Health Organization (WHO) data on COVID-19 infection rates with an orienting vertical line. The latter contains a radar chart allowing the visitor to discover differences between all 15 search terms across the countries, as well as a small multiple time series graph displaying the changes over the study time period.</a:t>
+              <a:t>Germany, the Netherlands and the United Kingdom, along with a line chart of World Health Organization (WHO) data on COVID-19 infection rates with an orienting vertical line. The latter contains a radar chart allowing the visitor to discover differences between all 15 search terms across the countries, as well as a small multiple time series plot displaying the changes over the study time period.</a:t>
             </a:r>
             <a:endParaRPr lang="en-US" baseline="0" dirty="0"/>
           </a:p>
@@ -2186,7 +2186,7 @@
             <a:pPr fontAlgn="base"/>
             <a:r>
               <a:rPr lang="en-US" dirty="0"/>
-              <a:t>Clicking on the navigation button COUNTRY a radar chart pops up comparing the 15 search terms across the countries selected in the dropdown menu (Fig. 3). A timeline animation can be started, or the time can be selected individually. N</a:t>
+              <a:t>Clicking on the navigation button COUNTRY a radar chart pops up comparing the 15 search terms across the countries selected in the dropdown menu (Fig. 3). A timeline animation can be started, or the date can be selected individually. N</a:t>
             </a:r>
             <a:r>
               <a:rPr lang="en-GB" dirty="0" err="1"/>
@@ -2194,7 +2194,7 @@
             </a:r>
             <a:r>
               <a:rPr lang="en-GB" dirty="0"/>
-              <a:t> and positive values indicate lower or higher searches compared to the year before. Additional support is given by line plots presenting the evolution of each search term</a:t>
+              <a:t> and positive values indicate lower or higher searches compared to the year before. Additional context is given by line plots presenting the evolution of each search term</a:t>
             </a:r>
             <a:r>
               <a:rPr lang="de-DE" dirty="0"/>
@@ -2233,7 +2233,7 @@
           <a:p>
             <a:r>
               <a:rPr lang="en-GB" dirty="0"/>
-              <a:t>We used the Google Trends data from 1/2019 to 11/2020 and calculated the differences between the first and the second year </a:t>
+              <a:t>We used the Google Trends data from January 2019 to November 2020 and calculated the differences between the first and the second year </a:t>
             </a:r>
             <a:r>
               <a:rPr lang="en-US" dirty="0"/>
@@ -2734,7 +2734,13 @@
             </a:r>
             <a:r>
               <a:rPr lang="en-GB" sz="2200" u="sng" dirty="0">
-                <a:hlinkClick r:id="rId3"/>
+                <a:hlinkClick r:id="rId3">
+                  <a:extLst>
+                    <a:ext uri="{A12FA001-AC4F-418D-AE19-62706E023703}">
+                      <ahyp:hlinkClr xmlns:ahyp="http://schemas.microsoft.com/office/drawing/2018/hyperlinkcolor" val="tx"/>
+                    </a:ext>
+                  </a:extLst>
+                </a:hlinkClick>
               </a:rPr>
               <a:t>https://trends.google.com/trends/?geo=US</a:t>
             </a:r>
@@ -2752,7 +2758,13 @@
             </a:r>
             <a:r>
               <a:rPr lang="en-GB" sz="2200" u="sng" dirty="0">
-                <a:hlinkClick r:id="rId4"/>
+                <a:hlinkClick r:id="rId4">
+                  <a:extLst>
+                    <a:ext uri="{A12FA001-AC4F-418D-AE19-62706E023703}">
+                      <ahyp:hlinkClr xmlns:ahyp="http://schemas.microsoft.com/office/drawing/2018/hyperlinkcolor" val="tx"/>
+                    </a:ext>
+                  </a:extLst>
+                </a:hlinkClick>
               </a:rPr>
               <a:t>https://covid19.who.int/</a:t>
             </a:r>
@@ -2989,7 +3001,7 @@
         <p:spPr>
           <a:xfrm>
             <a:off x="1079621" y="26761549"/>
-            <a:ext cx="4481625" cy="553998"/>
+            <a:ext cx="4481625" cy="276999"/>
           </a:xfrm>
           <a:prstGeom prst="rect">
             <a:avLst/>
@@ -3006,7 +3018,7 @@
                 <a:latin typeface="Roboto Condensed Light" pitchFamily="2" charset="0"/>
                 <a:ea typeface="Roboto Condensed Light" pitchFamily="2" charset="0"/>
               </a:rPr>
-              <a:t>Fig. 1 Search trends visualized by icon buttons</a:t>
+              <a:t>Fig. 1 Search trends visualized by icon buttons.</a:t>
             </a:r>
             <a:endParaRPr lang="de-AT" i="1" dirty="0">
               <a:latin typeface="Roboto Condensed Light" pitchFamily="2" charset="0"/>

</xml_diff>